<commit_message>
Update to all slide templates
Bolds every code slide
Ensure that they slides start in presenter mode
Fixes all the shadows for images to be the same
</commit_message>
<xml_diff>
--- a/01-introduction.pptx
+++ b/01-introduction.pptx
@@ -286,7 +286,7 @@
               <a:pPr>
                 <a:defRPr/>
               </a:pPr>
-              <a:t>2016-01-29</a:t>
+              <a:t>2016-02-27</a:t>
             </a:fld>
             <a:endParaRPr lang="en-US" dirty="0"/>
           </a:p>
@@ -469,7 +469,7 @@
               <a:pPr>
                 <a:defRPr/>
               </a:pPr>
-              <a:t>2016-01-29</a:t>
+              <a:t>2016-02-27</a:t>
             </a:fld>
             <a:endParaRPr lang="en-US" dirty="0"/>
           </a:p>
@@ -1825,7 +1825,7 @@
           <a:p>
             <a:r>
               <a:rPr lang="en-US" baseline="0" dirty="0" smtClean="0"/>
-              <a:t>This curiosity should can also be employed by exploring the boundaries of the tools you are using and the language you are writing. The exercises and the labs we will perform will often lead you through examples that work from the beginning to the end. When you develop solutions it is rare that something works from the start all the way to the end. Errors and issues come up from typos or the incorrect usage of a command of the programming language. When you fall off the path it can often be hard to find your way back. Here, if you find yourself always on the correct path explore what happens when you step off of it, what you see, the error messages you are presented with, the new results you might find.</a:t>
+              <a:t>This curiosity can also be employed by exploring the boundaries of the tools you are using and the language you are writing. The exercises and the labs we will perform will often lead you through examples that work from the beginning to the end. When you develop solutions it is rare that something works from the start all the way to the end. Errors and issues come up from typos or the incorrect usage of a command of the programming language. When you fall off the path it can often be hard to find your way back. Here, if you find yourself always on the correct path explore what happens when you step off of it, what you see, the error messages you are presented with, the new results you might find.</a:t>
             </a:r>
           </a:p>
         </p:txBody>
@@ -2969,7 +2969,7 @@
               <a:buFont typeface="Arial" pitchFamily="34" charset="0"/>
               <a:buNone/>
               <a:tabLst/>
-              <a:defRPr sz="2800">
+              <a:defRPr sz="2800" b="1">
                 <a:latin typeface="Courier New" panose="02070309020205020404" pitchFamily="49" charset="0"/>
                 <a:cs typeface="Courier New" panose="02070309020205020404" pitchFamily="49" charset="0"/>
               </a:defRPr>
@@ -3282,14 +3282,14 @@
           </a:ln>
           <a:extLst>
             <a:ext uri="{909E8E84-426E-40dd-AFC4-6F175D3DCCD1}">
-              <a14:hiddenFill xmlns:a14="http://schemas.microsoft.com/office/drawing/2010/main" xmlns="">
+              <a14:hiddenFill xmlns="" xmlns:a14="http://schemas.microsoft.com/office/drawing/2010/main">
                 <a:solidFill>
                   <a:srgbClr val="FFFFFF"/>
                 </a:solidFill>
               </a14:hiddenFill>
             </a:ext>
             <a:ext uri="{91240B29-F687-4f45-9708-019B960494DF}">
-              <a14:hiddenLine xmlns:a14="http://schemas.microsoft.com/office/drawing/2010/main" xmlns="" w="9525">
+              <a14:hiddenLine xmlns="" xmlns:a14="http://schemas.microsoft.com/office/drawing/2010/main" w="9525">
                 <a:solidFill>
                   <a:srgbClr val="000000"/>
                 </a:solidFill>
@@ -3437,14 +3437,14 @@
           </a:ln>
           <a:extLst>
             <a:ext uri="{909E8E84-426E-40dd-AFC4-6F175D3DCCD1}">
-              <a14:hiddenFill xmlns:a14="http://schemas.microsoft.com/office/drawing/2010/main" xmlns="">
+              <a14:hiddenFill xmlns="" xmlns:a14="http://schemas.microsoft.com/office/drawing/2010/main">
                 <a:solidFill>
                   <a:srgbClr val="FFFFFF"/>
                 </a:solidFill>
               </a14:hiddenFill>
             </a:ext>
             <a:ext uri="{91240B29-F687-4f45-9708-019B960494DF}">
-              <a14:hiddenLine xmlns:a14="http://schemas.microsoft.com/office/drawing/2010/main" xmlns="" w="9525">
+              <a14:hiddenLine xmlns="" xmlns:a14="http://schemas.microsoft.com/office/drawing/2010/main" w="9525">
                 <a:solidFill>
                   <a:srgbClr val="000000"/>
                 </a:solidFill>
@@ -3935,14 +3935,14 @@
           </a:ln>
           <a:extLst>
             <a:ext uri="{909E8E84-426E-40dd-AFC4-6F175D3DCCD1}">
-              <a14:hiddenFill xmlns:a14="http://schemas.microsoft.com/office/drawing/2010/main" xmlns="">
+              <a14:hiddenFill xmlns="" xmlns:a14="http://schemas.microsoft.com/office/drawing/2010/main">
                 <a:solidFill>
                   <a:srgbClr val="FFFFFF"/>
                 </a:solidFill>
               </a14:hiddenFill>
             </a:ext>
             <a:ext uri="{91240B29-F687-4f45-9708-019B960494DF}">
-              <a14:hiddenLine xmlns:a14="http://schemas.microsoft.com/office/drawing/2010/main" xmlns="" w="9525">
+              <a14:hiddenLine xmlns="" xmlns:a14="http://schemas.microsoft.com/office/drawing/2010/main" w="9525">
                 <a:solidFill>
                   <a:srgbClr val="000000"/>
                 </a:solidFill>
@@ -5391,14 +5391,14 @@
           </a:ln>
           <a:extLst>
             <a:ext uri="{909E8E84-426E-40dd-AFC4-6F175D3DCCD1}">
-              <a14:hiddenFill xmlns:a14="http://schemas.microsoft.com/office/drawing/2010/main" xmlns="">
+              <a14:hiddenFill xmlns="" xmlns:a14="http://schemas.microsoft.com/office/drawing/2010/main">
                 <a:solidFill>
                   <a:srgbClr val="FFFFFF"/>
                 </a:solidFill>
               </a14:hiddenFill>
             </a:ext>
             <a:ext uri="{91240B29-F687-4f45-9708-019B960494DF}">
-              <a14:hiddenLine xmlns:a14="http://schemas.microsoft.com/office/drawing/2010/main" xmlns="" w="9525">
+              <a14:hiddenLine xmlns="" xmlns:a14="http://schemas.microsoft.com/office/drawing/2010/main" w="9525">
                 <a:solidFill>
                   <a:srgbClr val="000000"/>
                 </a:solidFill>
@@ -6752,14 +6752,14 @@
           </a:ln>
           <a:extLst>
             <a:ext uri="{909E8E84-426E-40dd-AFC4-6F175D3DCCD1}">
-              <a14:hiddenFill xmlns:a14="http://schemas.microsoft.com/office/drawing/2010/main" xmlns="">
+              <a14:hiddenFill xmlns="" xmlns:a14="http://schemas.microsoft.com/office/drawing/2010/main">
                 <a:solidFill>
                   <a:srgbClr val="FFFFFF"/>
                 </a:solidFill>
               </a14:hiddenFill>
             </a:ext>
             <a:ext uri="{91240B29-F687-4f45-9708-019B960494DF}">
-              <a14:hiddenLine xmlns:a14="http://schemas.microsoft.com/office/drawing/2010/main" xmlns="" w="9525">
+              <a14:hiddenLine xmlns="" xmlns:a14="http://schemas.microsoft.com/office/drawing/2010/main" w="9525">
                 <a:solidFill>
                   <a:srgbClr val="000000"/>
                 </a:solidFill>
@@ -6851,7 +6851,7 @@
               <a:buFont typeface="Arial" pitchFamily="34" charset="0"/>
               <a:buNone/>
               <a:tabLst/>
-              <a:defRPr sz="2800">
+              <a:defRPr sz="2800" b="1">
                 <a:solidFill>
                   <a:srgbClr val="FFFFFF"/>
                 </a:solidFill>
@@ -7153,7 +7153,7 @@
               <a:buFont typeface="Wingdings" charset="0"/>
               <a:buNone/>
               <a:tabLst/>
-              <a:defRPr sz="2800" baseline="0">
+              <a:defRPr sz="2800" b="1" baseline="0">
                 <a:solidFill>
                   <a:schemeClr val="bg1"/>
                 </a:solidFill>
@@ -7317,14 +7317,14 @@
           </a:ln>
           <a:extLst>
             <a:ext uri="{909E8E84-426E-40dd-AFC4-6F175D3DCCD1}">
-              <a14:hiddenFill xmlns:a14="http://schemas.microsoft.com/office/drawing/2010/main" xmlns="">
+              <a14:hiddenFill xmlns="" xmlns:a14="http://schemas.microsoft.com/office/drawing/2010/main">
                 <a:solidFill>
                   <a:srgbClr val="FFFFFF"/>
                 </a:solidFill>
               </a14:hiddenFill>
             </a:ext>
             <a:ext uri="{91240B29-F687-4f45-9708-019B960494DF}">
-              <a14:hiddenLine xmlns:a14="http://schemas.microsoft.com/office/drawing/2010/main" xmlns="" w="9525">
+              <a14:hiddenLine xmlns="" xmlns:a14="http://schemas.microsoft.com/office/drawing/2010/main" w="9525">
                 <a:solidFill>
                   <a:srgbClr val="000000"/>
                 </a:solidFill>
@@ -7450,7 +7450,7 @@
               <a:buFont typeface="Arial" pitchFamily="34" charset="0"/>
               <a:buNone/>
               <a:tabLst/>
-              <a:defRPr sz="2800">
+              <a:defRPr sz="2800" b="1">
                 <a:solidFill>
                   <a:srgbClr val="FFFFFF"/>
                 </a:solidFill>
@@ -7727,7 +7727,7 @@
               <a:buFont typeface="Arial" pitchFamily="34" charset="0"/>
               <a:buNone/>
               <a:tabLst/>
-              <a:defRPr sz="3200" baseline="0">
+              <a:defRPr sz="3200" b="1" baseline="0">
                 <a:solidFill>
                   <a:schemeClr val="bg1"/>
                 </a:solidFill>
@@ -7891,14 +7891,14 @@
           </a:ln>
           <a:extLst>
             <a:ext uri="{909E8E84-426E-40dd-AFC4-6F175D3DCCD1}">
-              <a14:hiddenFill xmlns:a14="http://schemas.microsoft.com/office/drawing/2010/main" xmlns="">
+              <a14:hiddenFill xmlns="" xmlns:a14="http://schemas.microsoft.com/office/drawing/2010/main">
                 <a:solidFill>
                   <a:srgbClr val="FFFFFF"/>
                 </a:solidFill>
               </a14:hiddenFill>
             </a:ext>
             <a:ext uri="{91240B29-F687-4f45-9708-019B960494DF}">
-              <a14:hiddenLine xmlns:a14="http://schemas.microsoft.com/office/drawing/2010/main" xmlns="" w="9525">
+              <a14:hiddenLine xmlns="" xmlns:a14="http://schemas.microsoft.com/office/drawing/2010/main" w="9525">
                 <a:solidFill>
                   <a:srgbClr val="000000"/>
                 </a:solidFill>
@@ -7984,7 +7984,7 @@
               <a:buFont typeface="Arial" pitchFamily="34" charset="0"/>
               <a:buNone/>
               <a:tabLst/>
-              <a:defRPr sz="2800">
+              <a:defRPr sz="2800" b="1">
                 <a:latin typeface="Courier New" panose="02070309020205020404" pitchFamily="49" charset="0"/>
                 <a:cs typeface="Courier New" panose="02070309020205020404" pitchFamily="49" charset="0"/>
               </a:defRPr>
@@ -8281,7 +8281,7 @@
               <a:buFont typeface="Arial" pitchFamily="34" charset="0"/>
               <a:buNone/>
               <a:tabLst/>
-              <a:defRPr sz="2800" baseline="0">
+              <a:defRPr sz="2800" b="1" baseline="0">
                 <a:latin typeface="Courier New" panose="02070309020205020404" pitchFamily="49" charset="0"/>
                 <a:cs typeface="Courier New" panose="02070309020205020404" pitchFamily="49" charset="0"/>
               </a:defRPr>
@@ -8509,7 +8509,7 @@
               <a:buFont typeface="Arial" pitchFamily="34" charset="0"/>
               <a:buNone/>
               <a:tabLst/>
-              <a:defRPr sz="2800">
+              <a:defRPr sz="2800" b="1">
                 <a:latin typeface="Courier New" panose="02070309020205020404" pitchFamily="49" charset="0"/>
                 <a:cs typeface="Courier New" panose="02070309020205020404" pitchFamily="49" charset="0"/>
               </a:defRPr>
@@ -8838,14 +8838,14 @@
           </a:ln>
           <a:extLst>
             <a:ext uri="{909E8E84-426E-40dd-AFC4-6F175D3DCCD1}">
-              <a14:hiddenFill xmlns:a14="http://schemas.microsoft.com/office/drawing/2010/main" xmlns="">
+              <a14:hiddenFill xmlns="" xmlns:a14="http://schemas.microsoft.com/office/drawing/2010/main">
                 <a:solidFill>
                   <a:srgbClr val="FFFFFF"/>
                 </a:solidFill>
               </a14:hiddenFill>
             </a:ext>
             <a:ext uri="{91240B29-F687-4f45-9708-019B960494DF}">
-              <a14:hiddenLine xmlns:a14="http://schemas.microsoft.com/office/drawing/2010/main" xmlns="" w="9525">
+              <a14:hiddenLine xmlns="" xmlns:a14="http://schemas.microsoft.com/office/drawing/2010/main" w="9525">
                 <a:solidFill>
                   <a:srgbClr val="000000"/>
                 </a:solidFill>
@@ -9585,14 +9585,14 @@
           </a:ln>
           <a:extLst>
             <a:ext uri="{909E8E84-426E-40dd-AFC4-6F175D3DCCD1}">
-              <a14:hiddenFill xmlns:a14="http://schemas.microsoft.com/office/drawing/2010/main" xmlns="">
+              <a14:hiddenFill xmlns="" xmlns:a14="http://schemas.microsoft.com/office/drawing/2010/main">
                 <a:solidFill>
                   <a:srgbClr val="FFFFFF"/>
                 </a:solidFill>
               </a14:hiddenFill>
             </a:ext>
             <a:ext uri="{91240B29-F687-4f45-9708-019B960494DF}">
-              <a14:hiddenLine xmlns:a14="http://schemas.microsoft.com/office/drawing/2010/main" xmlns="" w="9525">
+              <a14:hiddenLine xmlns="" xmlns:a14="http://schemas.microsoft.com/office/drawing/2010/main" w="9525">
                 <a:solidFill>
                   <a:srgbClr val="000000"/>
                 </a:solidFill>

</xml_diff>

<commit_message>
Update all slides title and author
Included some more yak in the first refactoring section
Made some minor edits in the speaker notes
Brought in a different TDD / BDD slide that gets rid of the quote
</commit_message>
<xml_diff>
--- a/01-introduction.pptx
+++ b/01-introduction.pptx
@@ -286,7 +286,7 @@
               <a:pPr>
                 <a:defRPr/>
               </a:pPr>
-              <a:t>2016-02-27</a:t>
+              <a:t>2016-02-28</a:t>
             </a:fld>
             <a:endParaRPr lang="en-US" dirty="0"/>
           </a:p>
@@ -469,7 +469,7 @@
               <a:pPr>
                 <a:defRPr/>
               </a:pPr>
-              <a:t>2016-02-27</a:t>
+              <a:t>2016-02-28</a:t>
             </a:fld>
             <a:endParaRPr lang="en-US" dirty="0"/>
           </a:p>
@@ -1468,6 +1468,140 @@
 </p:notes>
 </file>
 
+<file path=ppt/notesSlides/notesSlide13.xml><?xml version="1.0" encoding="utf-8"?>
+<p:notes xmlns:a="http://schemas.openxmlformats.org/drawingml/2006/main" xmlns:r="http://schemas.openxmlformats.org/officeDocument/2006/relationships" xmlns:p="http://schemas.openxmlformats.org/presentationml/2006/main">
+  <p:cSld>
+    <p:spTree>
+      <p:nvGrpSpPr>
+        <p:cNvPr id="1" name=""/>
+        <p:cNvGrpSpPr/>
+        <p:nvPr/>
+      </p:nvGrpSpPr>
+      <p:grpSpPr>
+        <a:xfrm>
+          <a:off x="0" y="0"/>
+          <a:ext cx="0" cy="0"/>
+          <a:chOff x="0" y="0"/>
+          <a:chExt cx="0" cy="0"/>
+        </a:xfrm>
+      </p:grpSpPr>
+      <p:sp>
+        <p:nvSpPr>
+          <p:cNvPr id="2" name="Slide Image Placeholder 1"/>
+          <p:cNvSpPr>
+            <a:spLocks noGrp="1" noRot="1" noChangeAspect="1"/>
+          </p:cNvSpPr>
+          <p:nvPr>
+            <p:ph type="sldImg"/>
+          </p:nvPr>
+        </p:nvSpPr>
+        <p:spPr/>
+      </p:sp>
+      <p:sp>
+        <p:nvSpPr>
+          <p:cNvPr id="3" name="Notes Placeholder 2"/>
+          <p:cNvSpPr>
+            <a:spLocks noGrp="1"/>
+          </p:cNvSpPr>
+          <p:nvPr>
+            <p:ph type="body" idx="1"/>
+          </p:nvPr>
+        </p:nvSpPr>
+        <p:spPr/>
+        <p:txBody>
+          <a:bodyPr/>
+          <a:lstStyle/>
+          <a:p>
+            <a:endParaRPr lang="en-US"/>
+          </a:p>
+        </p:txBody>
+      </p:sp>
+      <p:sp>
+        <p:nvSpPr>
+          <p:cNvPr id="4" name="Slide Number Placeholder 3"/>
+          <p:cNvSpPr>
+            <a:spLocks noGrp="1"/>
+          </p:cNvSpPr>
+          <p:nvPr>
+            <p:ph type="sldNum" sz="quarter" idx="10"/>
+          </p:nvPr>
+        </p:nvSpPr>
+        <p:spPr/>
+        <p:txBody>
+          <a:bodyPr/>
+          <a:lstStyle/>
+          <a:p>
+            <a:pPr>
+              <a:defRPr/>
+            </a:pPr>
+            <a:fld id="{DC3734AA-3150-D947-AC52-2F5DF48BFCD5}" type="slidenum">
+              <a:rPr lang="en-US" smtClean="0"/>
+              <a:pPr>
+                <a:defRPr/>
+              </a:pPr>
+              <a:t>13</a:t>
+            </a:fld>
+            <a:endParaRPr lang="en-US" dirty="0"/>
+          </a:p>
+        </p:txBody>
+      </p:sp>
+      <p:sp>
+        <p:nvSpPr>
+          <p:cNvPr id="5" name="Header Placeholder 4"/>
+          <p:cNvSpPr>
+            <a:spLocks noGrp="1"/>
+          </p:cNvSpPr>
+          <p:nvPr>
+            <p:ph type="hdr" sz="quarter" idx="11"/>
+          </p:nvPr>
+        </p:nvSpPr>
+        <p:spPr/>
+        <p:txBody>
+          <a:bodyPr/>
+          <a:lstStyle/>
+          <a:p>
+            <a:pPr>
+              <a:defRPr/>
+            </a:pPr>
+            <a:endParaRPr lang="en-US"/>
+          </a:p>
+        </p:txBody>
+      </p:sp>
+      <p:sp>
+        <p:nvSpPr>
+          <p:cNvPr id="6" name="Footer Placeholder 5"/>
+          <p:cNvSpPr>
+            <a:spLocks noGrp="1"/>
+          </p:cNvSpPr>
+          <p:nvPr>
+            <p:ph type="ftr" sz="quarter" idx="12"/>
+          </p:nvPr>
+        </p:nvSpPr>
+        <p:spPr/>
+        <p:txBody>
+          <a:bodyPr/>
+          <a:lstStyle/>
+          <a:p>
+            <a:pPr>
+              <a:defRPr/>
+            </a:pPr>
+            <a:endParaRPr lang="en-US"/>
+          </a:p>
+        </p:txBody>
+      </p:sp>
+    </p:spTree>
+    <p:extLst>
+      <p:ext uri="{BB962C8B-B14F-4D97-AF65-F5344CB8AC3E}">
+        <p14:creationId xmlns:p14="http://schemas.microsoft.com/office/powerpoint/2010/main" val="584459865"/>
+      </p:ext>
+    </p:extLst>
+  </p:cSld>
+  <p:clrMapOvr>
+    <a:masterClrMapping/>
+  </p:clrMapOvr>
+</p:notes>
+</file>
+
 <file path=ppt/notesSlides/notesSlide2.xml><?xml version="1.0" encoding="utf-8"?>
 <p:notes xmlns:a="http://schemas.openxmlformats.org/drawingml/2006/main" xmlns:r="http://schemas.openxmlformats.org/officeDocument/2006/relationships" xmlns:p="http://schemas.openxmlformats.org/presentationml/2006/main">
   <p:cSld>
@@ -1674,7 +1808,15 @@
           <a:p>
             <a:r>
               <a:rPr lang="en-US" baseline="0" dirty="0" smtClean="0"/>
-              <a:t>During the introductions you learned about the other individuals here in the course with you. They may shared similar problems and domains. During the time that we are here respectfully reach out them so that you can continue the conversation, grow each others' knowledge, and become better professionals.</a:t>
+              <a:t>During the introductions you learned about the other individuals here in the course with you. They may </a:t>
+            </a:r>
+            <a:r>
+              <a:rPr lang="en-US" baseline="0" dirty="0" smtClean="0"/>
+              <a:t>have shared </a:t>
+            </a:r>
+            <a:r>
+              <a:rPr lang="en-US" baseline="0" dirty="0" smtClean="0"/>
+              <a:t>similar problems and domains. During the time that we are here respectfully reach out them so that you can continue the conversation, grow each others' knowledge, and become better professionals.</a:t>
             </a:r>
             <a:endParaRPr lang="en-US" dirty="0"/>
           </a:p>
@@ -2107,7 +2249,15 @@
             </a:r>
             <a:r>
               <a:rPr lang="en-US" baseline="0" dirty="0" smtClean="0"/>
-              <a:t> designed in a way to emphasize this hands-on approach to the content. Together, we will perform exercises together that accomplish an understood objective. After that is done we will often emphasize an activity by performing a lab. The lab is designed to challenge your understanding and retention of the previously accomplished exercises. You can work through this labs on your own or in groups. After completing the labs we will all come together again to review the exercise. Finally, we will end each section with a discussion about the topics that we introduced. These discussions will often ask you to share your opinions, recent experiences, or previous experiences within this domain.</a:t>
+              <a:t> designed in a way to emphasize this hands-on approach to the content. Together, we will perform exercises together that accomplish an understood objective. After that is done </a:t>
+            </a:r>
+            <a:r>
+              <a:rPr lang="en-US" baseline="0" dirty="0" smtClean="0"/>
+              <a:t>you will </a:t>
+            </a:r>
+            <a:r>
+              <a:rPr lang="en-US" baseline="0" dirty="0" smtClean="0"/>
+              <a:t>often emphasize an activity by performing a lab. The lab is designed to challenge your understanding and retention of the previously accomplished exercises. You can work through this labs on your own or in groups. After completing the labs we will all come together again to review the exercise. Finally, we will end each section with a discussion about the topics that we introduced. These discussions will often ask you to share your opinions, recent experiences, or previous experiences within this domain.</a:t>
             </a:r>
             <a:endParaRPr lang="en-US" dirty="0"/>
           </a:p>

</xml_diff>

<commit_message>
Update to the Introduction cover
</commit_message>
<xml_diff>
--- a/01-introduction.pptx
+++ b/01-introduction.pptx
@@ -286,7 +286,7 @@
               <a:pPr>
                 <a:defRPr/>
               </a:pPr>
-              <a:t>2016-02-29</a:t>
+              <a:t>2016-03-02</a:t>
             </a:fld>
             <a:endParaRPr lang="en-US" dirty="0"/>
           </a:p>
@@ -469,7 +469,7 @@
               <a:pPr>
                 <a:defRPr/>
               </a:pPr>
-              <a:t>2016-02-29</a:t>
+              <a:t>2016-03-02</a:t>
             </a:fld>
             <a:endParaRPr lang="en-US" dirty="0"/>
           </a:p>
@@ -3430,14 +3430,14 @@
           </a:ln>
           <a:extLst>
             <a:ext uri="{909E8E84-426E-40dd-AFC4-6F175D3DCCD1}">
-              <a14:hiddenFill xmlns:a14="http://schemas.microsoft.com/office/drawing/2010/main" xmlns="">
+              <a14:hiddenFill xmlns="" xmlns:a14="http://schemas.microsoft.com/office/drawing/2010/main">
                 <a:solidFill>
                   <a:srgbClr val="FFFFFF"/>
                 </a:solidFill>
               </a14:hiddenFill>
             </a:ext>
             <a:ext uri="{91240B29-F687-4f45-9708-019B960494DF}">
-              <a14:hiddenLine xmlns:a14="http://schemas.microsoft.com/office/drawing/2010/main" xmlns="" w="9525">
+              <a14:hiddenLine xmlns="" xmlns:a14="http://schemas.microsoft.com/office/drawing/2010/main" w="9525">
                 <a:solidFill>
                   <a:srgbClr val="000000"/>
                 </a:solidFill>
@@ -3585,14 +3585,14 @@
           </a:ln>
           <a:extLst>
             <a:ext uri="{909E8E84-426E-40dd-AFC4-6F175D3DCCD1}">
-              <a14:hiddenFill xmlns:a14="http://schemas.microsoft.com/office/drawing/2010/main" xmlns="">
+              <a14:hiddenFill xmlns="" xmlns:a14="http://schemas.microsoft.com/office/drawing/2010/main">
                 <a:solidFill>
                   <a:srgbClr val="FFFFFF"/>
                 </a:solidFill>
               </a14:hiddenFill>
             </a:ext>
             <a:ext uri="{91240B29-F687-4f45-9708-019B960494DF}">
-              <a14:hiddenLine xmlns:a14="http://schemas.microsoft.com/office/drawing/2010/main" xmlns="" w="9525">
+              <a14:hiddenLine xmlns="" xmlns:a14="http://schemas.microsoft.com/office/drawing/2010/main" w="9525">
                 <a:solidFill>
                   <a:srgbClr val="000000"/>
                 </a:solidFill>
@@ -4090,14 +4090,14 @@
           </a:ln>
           <a:extLst>
             <a:ext uri="{909E8E84-426E-40dd-AFC4-6F175D3DCCD1}">
-              <a14:hiddenFill xmlns:a14="http://schemas.microsoft.com/office/drawing/2010/main" xmlns="">
+              <a14:hiddenFill xmlns="" xmlns:a14="http://schemas.microsoft.com/office/drawing/2010/main">
                 <a:solidFill>
                   <a:srgbClr val="FFFFFF"/>
                 </a:solidFill>
               </a14:hiddenFill>
             </a:ext>
             <a:ext uri="{91240B29-F687-4f45-9708-019B960494DF}">
-              <a14:hiddenLine xmlns:a14="http://schemas.microsoft.com/office/drawing/2010/main" xmlns="" w="9525">
+              <a14:hiddenLine xmlns="" xmlns:a14="http://schemas.microsoft.com/office/drawing/2010/main" w="9525">
                 <a:solidFill>
                   <a:srgbClr val="000000"/>
                 </a:solidFill>
@@ -5581,14 +5581,14 @@
           </a:ln>
           <a:extLst>
             <a:ext uri="{909E8E84-426E-40dd-AFC4-6F175D3DCCD1}">
-              <a14:hiddenFill xmlns:a14="http://schemas.microsoft.com/office/drawing/2010/main" xmlns="">
+              <a14:hiddenFill xmlns="" xmlns:a14="http://schemas.microsoft.com/office/drawing/2010/main">
                 <a:solidFill>
                   <a:srgbClr val="FFFFFF"/>
                 </a:solidFill>
               </a14:hiddenFill>
             </a:ext>
             <a:ext uri="{91240B29-F687-4f45-9708-019B960494DF}">
-              <a14:hiddenLine xmlns:a14="http://schemas.microsoft.com/office/drawing/2010/main" xmlns="" w="9525">
+              <a14:hiddenLine xmlns="" xmlns:a14="http://schemas.microsoft.com/office/drawing/2010/main" w="9525">
                 <a:solidFill>
                   <a:srgbClr val="000000"/>
                 </a:solidFill>
@@ -6977,14 +6977,14 @@
           </a:ln>
           <a:extLst>
             <a:ext uri="{909E8E84-426E-40dd-AFC4-6F175D3DCCD1}">
-              <a14:hiddenFill xmlns:a14="http://schemas.microsoft.com/office/drawing/2010/main" xmlns="">
+              <a14:hiddenFill xmlns="" xmlns:a14="http://schemas.microsoft.com/office/drawing/2010/main">
                 <a:solidFill>
                   <a:srgbClr val="FFFFFF"/>
                 </a:solidFill>
               </a14:hiddenFill>
             </a:ext>
             <a:ext uri="{91240B29-F687-4f45-9708-019B960494DF}">
-              <a14:hiddenLine xmlns:a14="http://schemas.microsoft.com/office/drawing/2010/main" xmlns="" w="9525">
+              <a14:hiddenLine xmlns="" xmlns:a14="http://schemas.microsoft.com/office/drawing/2010/main" w="9525">
                 <a:solidFill>
                   <a:srgbClr val="000000"/>
                 </a:solidFill>
@@ -7556,14 +7556,14 @@
           </a:ln>
           <a:extLst>
             <a:ext uri="{909E8E84-426E-40dd-AFC4-6F175D3DCCD1}">
-              <a14:hiddenFill xmlns:a14="http://schemas.microsoft.com/office/drawing/2010/main" xmlns="">
+              <a14:hiddenFill xmlns="" xmlns:a14="http://schemas.microsoft.com/office/drawing/2010/main">
                 <a:solidFill>
                   <a:srgbClr val="FFFFFF"/>
                 </a:solidFill>
               </a14:hiddenFill>
             </a:ext>
             <a:ext uri="{91240B29-F687-4f45-9708-019B960494DF}">
-              <a14:hiddenLine xmlns:a14="http://schemas.microsoft.com/office/drawing/2010/main" xmlns="" w="9525">
+              <a14:hiddenLine xmlns="" xmlns:a14="http://schemas.microsoft.com/office/drawing/2010/main" w="9525">
                 <a:solidFill>
                   <a:srgbClr val="000000"/>
                 </a:solidFill>
@@ -8144,14 +8144,14 @@
           </a:ln>
           <a:extLst>
             <a:ext uri="{909E8E84-426E-40dd-AFC4-6F175D3DCCD1}">
-              <a14:hiddenFill xmlns:a14="http://schemas.microsoft.com/office/drawing/2010/main" xmlns="">
+              <a14:hiddenFill xmlns="" xmlns:a14="http://schemas.microsoft.com/office/drawing/2010/main">
                 <a:solidFill>
                   <a:srgbClr val="FFFFFF"/>
                 </a:solidFill>
               </a14:hiddenFill>
             </a:ext>
             <a:ext uri="{91240B29-F687-4f45-9708-019B960494DF}">
-              <a14:hiddenLine xmlns:a14="http://schemas.microsoft.com/office/drawing/2010/main" xmlns="" w="9525">
+              <a14:hiddenLine xmlns="" xmlns:a14="http://schemas.microsoft.com/office/drawing/2010/main" w="9525">
                 <a:solidFill>
                   <a:srgbClr val="000000"/>
                 </a:solidFill>
@@ -9112,14 +9112,14 @@
           </a:ln>
           <a:extLst>
             <a:ext uri="{909E8E84-426E-40dd-AFC4-6F175D3DCCD1}">
-              <a14:hiddenFill xmlns:a14="http://schemas.microsoft.com/office/drawing/2010/main" xmlns="">
+              <a14:hiddenFill xmlns="" xmlns:a14="http://schemas.microsoft.com/office/drawing/2010/main">
                 <a:solidFill>
                   <a:srgbClr val="FFFFFF"/>
                 </a:solidFill>
               </a14:hiddenFill>
             </a:ext>
             <a:ext uri="{91240B29-F687-4f45-9708-019B960494DF}">
-              <a14:hiddenLine xmlns:a14="http://schemas.microsoft.com/office/drawing/2010/main" xmlns="" w="9525">
+              <a14:hiddenLine xmlns="" xmlns:a14="http://schemas.microsoft.com/office/drawing/2010/main" w="9525">
                 <a:solidFill>
                   <a:srgbClr val="000000"/>
                 </a:solidFill>
@@ -9881,14 +9881,14 @@
           </a:ln>
           <a:extLst>
             <a:ext uri="{909E8E84-426E-40dd-AFC4-6F175D3DCCD1}">
-              <a14:hiddenFill xmlns:a14="http://schemas.microsoft.com/office/drawing/2010/main" xmlns="">
+              <a14:hiddenFill xmlns="" xmlns:a14="http://schemas.microsoft.com/office/drawing/2010/main">
                 <a:solidFill>
                   <a:srgbClr val="FFFFFF"/>
                 </a:solidFill>
               </a14:hiddenFill>
             </a:ext>
             <a:ext uri="{91240B29-F687-4f45-9708-019B960494DF}">
-              <a14:hiddenLine xmlns:a14="http://schemas.microsoft.com/office/drawing/2010/main" xmlns="" w="9525">
+              <a14:hiddenLine xmlns="" xmlns:a14="http://schemas.microsoft.com/office/drawing/2010/main" w="9525">
                 <a:solidFill>
                   <a:srgbClr val="000000"/>
                 </a:solidFill>
@@ -10677,6 +10677,36 @@
           </a:p>
         </p:txBody>
       </p:sp>
+      <p:pic>
+        <p:nvPicPr>
+          <p:cNvPr id="4" name="Picture 3"/>
+          <p:cNvPicPr>
+            <a:picLocks noChangeAspect="1"/>
+          </p:cNvPicPr>
+          <p:nvPr/>
+        </p:nvPicPr>
+        <p:blipFill>
+          <a:blip r:embed="rId3">
+            <a:extLst>
+              <a:ext uri="{28A0092B-C50C-407E-A947-70E740481C1C}">
+                <a14:useLocalDpi xmlns:a14="http://schemas.microsoft.com/office/drawing/2010/main" val="0"/>
+              </a:ext>
+            </a:extLst>
+          </a:blip>
+          <a:stretch>
+            <a:fillRect/>
+          </a:stretch>
+        </p:blipFill>
+        <p:spPr>
+          <a:xfrm>
+            <a:off x="0" y="0"/>
+            <a:ext cx="16256000" cy="9136069"/>
+          </a:xfrm>
+          <a:prstGeom prst="rect">
+            <a:avLst/>
+          </a:prstGeom>
+        </p:spPr>
+      </p:pic>
     </p:spTree>
     <p:extLst>
       <p:ext uri="{BB962C8B-B14F-4D97-AF65-F5344CB8AC3E}">

</xml_diff>

<commit_message>
Adds a title image to the Introduction
</commit_message>
<xml_diff>
--- a/01-introduction.pptx
+++ b/01-introduction.pptx
@@ -286,7 +286,7 @@
               <a:pPr>
                 <a:defRPr/>
               </a:pPr>
-              <a:t>2016-03-02</a:t>
+              <a:t>2016-04-12</a:t>
             </a:fld>
             <a:endParaRPr lang="en-US" dirty="0"/>
           </a:p>
@@ -469,7 +469,7 @@
               <a:pPr>
                 <a:defRPr/>
               </a:pPr>
-              <a:t>2016-03-02</a:t>
+              <a:t>2016-04-12</a:t>
             </a:fld>
             <a:endParaRPr lang="en-US" dirty="0"/>
           </a:p>
@@ -3430,14 +3430,14 @@
           </a:ln>
           <a:extLst>
             <a:ext uri="{909E8E84-426E-40dd-AFC4-6F175D3DCCD1}">
-              <a14:hiddenFill xmlns="" xmlns:a14="http://schemas.microsoft.com/office/drawing/2010/main">
+              <a14:hiddenFill xmlns:a14="http://schemas.microsoft.com/office/drawing/2010/main" xmlns="">
                 <a:solidFill>
                   <a:srgbClr val="FFFFFF"/>
                 </a:solidFill>
               </a14:hiddenFill>
             </a:ext>
             <a:ext uri="{91240B29-F687-4f45-9708-019B960494DF}">
-              <a14:hiddenLine xmlns="" xmlns:a14="http://schemas.microsoft.com/office/drawing/2010/main" w="9525">
+              <a14:hiddenLine xmlns:a14="http://schemas.microsoft.com/office/drawing/2010/main" xmlns="" w="9525">
                 <a:solidFill>
                   <a:srgbClr val="000000"/>
                 </a:solidFill>
@@ -3585,14 +3585,14 @@
           </a:ln>
           <a:extLst>
             <a:ext uri="{909E8E84-426E-40dd-AFC4-6F175D3DCCD1}">
-              <a14:hiddenFill xmlns="" xmlns:a14="http://schemas.microsoft.com/office/drawing/2010/main">
+              <a14:hiddenFill xmlns:a14="http://schemas.microsoft.com/office/drawing/2010/main" xmlns="">
                 <a:solidFill>
                   <a:srgbClr val="FFFFFF"/>
                 </a:solidFill>
               </a14:hiddenFill>
             </a:ext>
             <a:ext uri="{91240B29-F687-4f45-9708-019B960494DF}">
-              <a14:hiddenLine xmlns="" xmlns:a14="http://schemas.microsoft.com/office/drawing/2010/main" w="9525">
+              <a14:hiddenLine xmlns:a14="http://schemas.microsoft.com/office/drawing/2010/main" xmlns="" w="9525">
                 <a:solidFill>
                   <a:srgbClr val="000000"/>
                 </a:solidFill>
@@ -4090,14 +4090,14 @@
           </a:ln>
           <a:extLst>
             <a:ext uri="{909E8E84-426E-40dd-AFC4-6F175D3DCCD1}">
-              <a14:hiddenFill xmlns="" xmlns:a14="http://schemas.microsoft.com/office/drawing/2010/main">
+              <a14:hiddenFill xmlns:a14="http://schemas.microsoft.com/office/drawing/2010/main" xmlns="">
                 <a:solidFill>
                   <a:srgbClr val="FFFFFF"/>
                 </a:solidFill>
               </a14:hiddenFill>
             </a:ext>
             <a:ext uri="{91240B29-F687-4f45-9708-019B960494DF}">
-              <a14:hiddenLine xmlns="" xmlns:a14="http://schemas.microsoft.com/office/drawing/2010/main" w="9525">
+              <a14:hiddenLine xmlns:a14="http://schemas.microsoft.com/office/drawing/2010/main" xmlns="" w="9525">
                 <a:solidFill>
                   <a:srgbClr val="000000"/>
                 </a:solidFill>
@@ -5581,14 +5581,14 @@
           </a:ln>
           <a:extLst>
             <a:ext uri="{909E8E84-426E-40dd-AFC4-6F175D3DCCD1}">
-              <a14:hiddenFill xmlns="" xmlns:a14="http://schemas.microsoft.com/office/drawing/2010/main">
+              <a14:hiddenFill xmlns:a14="http://schemas.microsoft.com/office/drawing/2010/main" xmlns="">
                 <a:solidFill>
                   <a:srgbClr val="FFFFFF"/>
                 </a:solidFill>
               </a14:hiddenFill>
             </a:ext>
             <a:ext uri="{91240B29-F687-4f45-9708-019B960494DF}">
-              <a14:hiddenLine xmlns="" xmlns:a14="http://schemas.microsoft.com/office/drawing/2010/main" w="9525">
+              <a14:hiddenLine xmlns:a14="http://schemas.microsoft.com/office/drawing/2010/main" xmlns="" w="9525">
                 <a:solidFill>
                   <a:srgbClr val="000000"/>
                 </a:solidFill>
@@ -6977,14 +6977,14 @@
           </a:ln>
           <a:extLst>
             <a:ext uri="{909E8E84-426E-40dd-AFC4-6F175D3DCCD1}">
-              <a14:hiddenFill xmlns="" xmlns:a14="http://schemas.microsoft.com/office/drawing/2010/main">
+              <a14:hiddenFill xmlns:a14="http://schemas.microsoft.com/office/drawing/2010/main" xmlns="">
                 <a:solidFill>
                   <a:srgbClr val="FFFFFF"/>
                 </a:solidFill>
               </a14:hiddenFill>
             </a:ext>
             <a:ext uri="{91240B29-F687-4f45-9708-019B960494DF}">
-              <a14:hiddenLine xmlns="" xmlns:a14="http://schemas.microsoft.com/office/drawing/2010/main" w="9525">
+              <a14:hiddenLine xmlns:a14="http://schemas.microsoft.com/office/drawing/2010/main" xmlns="" w="9525">
                 <a:solidFill>
                   <a:srgbClr val="000000"/>
                 </a:solidFill>
@@ -7556,14 +7556,14 @@
           </a:ln>
           <a:extLst>
             <a:ext uri="{909E8E84-426E-40dd-AFC4-6F175D3DCCD1}">
-              <a14:hiddenFill xmlns="" xmlns:a14="http://schemas.microsoft.com/office/drawing/2010/main">
+              <a14:hiddenFill xmlns:a14="http://schemas.microsoft.com/office/drawing/2010/main" xmlns="">
                 <a:solidFill>
                   <a:srgbClr val="FFFFFF"/>
                 </a:solidFill>
               </a14:hiddenFill>
             </a:ext>
             <a:ext uri="{91240B29-F687-4f45-9708-019B960494DF}">
-              <a14:hiddenLine xmlns="" xmlns:a14="http://schemas.microsoft.com/office/drawing/2010/main" w="9525">
+              <a14:hiddenLine xmlns:a14="http://schemas.microsoft.com/office/drawing/2010/main" xmlns="" w="9525">
                 <a:solidFill>
                   <a:srgbClr val="000000"/>
                 </a:solidFill>
@@ -8144,14 +8144,14 @@
           </a:ln>
           <a:extLst>
             <a:ext uri="{909E8E84-426E-40dd-AFC4-6F175D3DCCD1}">
-              <a14:hiddenFill xmlns="" xmlns:a14="http://schemas.microsoft.com/office/drawing/2010/main">
+              <a14:hiddenFill xmlns:a14="http://schemas.microsoft.com/office/drawing/2010/main" xmlns="">
                 <a:solidFill>
                   <a:srgbClr val="FFFFFF"/>
                 </a:solidFill>
               </a14:hiddenFill>
             </a:ext>
             <a:ext uri="{91240B29-F687-4f45-9708-019B960494DF}">
-              <a14:hiddenLine xmlns="" xmlns:a14="http://schemas.microsoft.com/office/drawing/2010/main" w="9525">
+              <a14:hiddenLine xmlns:a14="http://schemas.microsoft.com/office/drawing/2010/main" xmlns="" w="9525">
                 <a:solidFill>
                   <a:srgbClr val="000000"/>
                 </a:solidFill>
@@ -9112,14 +9112,14 @@
           </a:ln>
           <a:extLst>
             <a:ext uri="{909E8E84-426E-40dd-AFC4-6F175D3DCCD1}">
-              <a14:hiddenFill xmlns="" xmlns:a14="http://schemas.microsoft.com/office/drawing/2010/main">
+              <a14:hiddenFill xmlns:a14="http://schemas.microsoft.com/office/drawing/2010/main" xmlns="">
                 <a:solidFill>
                   <a:srgbClr val="FFFFFF"/>
                 </a:solidFill>
               </a14:hiddenFill>
             </a:ext>
             <a:ext uri="{91240B29-F687-4f45-9708-019B960494DF}">
-              <a14:hiddenLine xmlns="" xmlns:a14="http://schemas.microsoft.com/office/drawing/2010/main" w="9525">
+              <a14:hiddenLine xmlns:a14="http://schemas.microsoft.com/office/drawing/2010/main" xmlns="" w="9525">
                 <a:solidFill>
                   <a:srgbClr val="000000"/>
                 </a:solidFill>
@@ -9881,14 +9881,14 @@
           </a:ln>
           <a:extLst>
             <a:ext uri="{909E8E84-426E-40dd-AFC4-6F175D3DCCD1}">
-              <a14:hiddenFill xmlns="" xmlns:a14="http://schemas.microsoft.com/office/drawing/2010/main">
+              <a14:hiddenFill xmlns:a14="http://schemas.microsoft.com/office/drawing/2010/main" xmlns="">
                 <a:solidFill>
                   <a:srgbClr val="FFFFFF"/>
                 </a:solidFill>
               </a14:hiddenFill>
             </a:ext>
             <a:ext uri="{91240B29-F687-4f45-9708-019B960494DF}">
-              <a14:hiddenLine xmlns="" xmlns:a14="http://schemas.microsoft.com/office/drawing/2010/main" w="9525">
+              <a14:hiddenLine xmlns:a14="http://schemas.microsoft.com/office/drawing/2010/main" xmlns="" w="9525">
                 <a:solidFill>
                   <a:srgbClr val="000000"/>
                 </a:solidFill>

</xml_diff>

<commit_message>
Updates to Chef DK 0.17.17 and InSpec
* Updated the Chef DK
* Changed the examples to InSpec
</commit_message>
<xml_diff>
--- a/01-introduction.pptx
+++ b/01-introduction.pptx
@@ -286,7 +286,7 @@
               <a:pPr>
                 <a:defRPr/>
               </a:pPr>
-              <a:t>2016-04-12</a:t>
+              <a:t>2016-08-29</a:t>
             </a:fld>
             <a:endParaRPr lang="en-US" dirty="0"/>
           </a:p>
@@ -469,7 +469,7 @@
               <a:pPr>
                 <a:defRPr/>
               </a:pPr>
-              <a:t>2016-04-12</a:t>
+              <a:t>2016-08-29</a:t>
             </a:fld>
             <a:endParaRPr lang="en-US" dirty="0"/>
           </a:p>
@@ -3430,14 +3430,14 @@
           </a:ln>
           <a:extLst>
             <a:ext uri="{909E8E84-426E-40dd-AFC4-6F175D3DCCD1}">
-              <a14:hiddenFill xmlns:a14="http://schemas.microsoft.com/office/drawing/2010/main" xmlns="">
+              <a14:hiddenFill xmlns="" xmlns:a14="http://schemas.microsoft.com/office/drawing/2010/main">
                 <a:solidFill>
                   <a:srgbClr val="FFFFFF"/>
                 </a:solidFill>
               </a14:hiddenFill>
             </a:ext>
             <a:ext uri="{91240B29-F687-4f45-9708-019B960494DF}">
-              <a14:hiddenLine xmlns:a14="http://schemas.microsoft.com/office/drawing/2010/main" xmlns="" w="9525">
+              <a14:hiddenLine xmlns="" xmlns:a14="http://schemas.microsoft.com/office/drawing/2010/main" w="9525">
                 <a:solidFill>
                   <a:srgbClr val="000000"/>
                 </a:solidFill>
@@ -3585,14 +3585,14 @@
           </a:ln>
           <a:extLst>
             <a:ext uri="{909E8E84-426E-40dd-AFC4-6F175D3DCCD1}">
-              <a14:hiddenFill xmlns:a14="http://schemas.microsoft.com/office/drawing/2010/main" xmlns="">
+              <a14:hiddenFill xmlns="" xmlns:a14="http://schemas.microsoft.com/office/drawing/2010/main">
                 <a:solidFill>
                   <a:srgbClr val="FFFFFF"/>
                 </a:solidFill>
               </a14:hiddenFill>
             </a:ext>
             <a:ext uri="{91240B29-F687-4f45-9708-019B960494DF}">
-              <a14:hiddenLine xmlns:a14="http://schemas.microsoft.com/office/drawing/2010/main" xmlns="" w="9525">
+              <a14:hiddenLine xmlns="" xmlns:a14="http://schemas.microsoft.com/office/drawing/2010/main" w="9525">
                 <a:solidFill>
                   <a:srgbClr val="000000"/>
                 </a:solidFill>
@@ -4090,14 +4090,14 @@
           </a:ln>
           <a:extLst>
             <a:ext uri="{909E8E84-426E-40dd-AFC4-6F175D3DCCD1}">
-              <a14:hiddenFill xmlns:a14="http://schemas.microsoft.com/office/drawing/2010/main" xmlns="">
+              <a14:hiddenFill xmlns="" xmlns:a14="http://schemas.microsoft.com/office/drawing/2010/main">
                 <a:solidFill>
                   <a:srgbClr val="FFFFFF"/>
                 </a:solidFill>
               </a14:hiddenFill>
             </a:ext>
             <a:ext uri="{91240B29-F687-4f45-9708-019B960494DF}">
-              <a14:hiddenLine xmlns:a14="http://schemas.microsoft.com/office/drawing/2010/main" xmlns="" w="9525">
+              <a14:hiddenLine xmlns="" xmlns:a14="http://schemas.microsoft.com/office/drawing/2010/main" w="9525">
                 <a:solidFill>
                   <a:srgbClr val="000000"/>
                 </a:solidFill>
@@ -5581,14 +5581,14 @@
           </a:ln>
           <a:extLst>
             <a:ext uri="{909E8E84-426E-40dd-AFC4-6F175D3DCCD1}">
-              <a14:hiddenFill xmlns:a14="http://schemas.microsoft.com/office/drawing/2010/main" xmlns="">
+              <a14:hiddenFill xmlns="" xmlns:a14="http://schemas.microsoft.com/office/drawing/2010/main">
                 <a:solidFill>
                   <a:srgbClr val="FFFFFF"/>
                 </a:solidFill>
               </a14:hiddenFill>
             </a:ext>
             <a:ext uri="{91240B29-F687-4f45-9708-019B960494DF}">
-              <a14:hiddenLine xmlns:a14="http://schemas.microsoft.com/office/drawing/2010/main" xmlns="" w="9525">
+              <a14:hiddenLine xmlns="" xmlns:a14="http://schemas.microsoft.com/office/drawing/2010/main" w="9525">
                 <a:solidFill>
                   <a:srgbClr val="000000"/>
                 </a:solidFill>
@@ -6977,14 +6977,14 @@
           </a:ln>
           <a:extLst>
             <a:ext uri="{909E8E84-426E-40dd-AFC4-6F175D3DCCD1}">
-              <a14:hiddenFill xmlns:a14="http://schemas.microsoft.com/office/drawing/2010/main" xmlns="">
+              <a14:hiddenFill xmlns="" xmlns:a14="http://schemas.microsoft.com/office/drawing/2010/main">
                 <a:solidFill>
                   <a:srgbClr val="FFFFFF"/>
                 </a:solidFill>
               </a14:hiddenFill>
             </a:ext>
             <a:ext uri="{91240B29-F687-4f45-9708-019B960494DF}">
-              <a14:hiddenLine xmlns:a14="http://schemas.microsoft.com/office/drawing/2010/main" xmlns="" w="9525">
+              <a14:hiddenLine xmlns="" xmlns:a14="http://schemas.microsoft.com/office/drawing/2010/main" w="9525">
                 <a:solidFill>
                   <a:srgbClr val="000000"/>
                 </a:solidFill>
@@ -7556,14 +7556,14 @@
           </a:ln>
           <a:extLst>
             <a:ext uri="{909E8E84-426E-40dd-AFC4-6F175D3DCCD1}">
-              <a14:hiddenFill xmlns:a14="http://schemas.microsoft.com/office/drawing/2010/main" xmlns="">
+              <a14:hiddenFill xmlns="" xmlns:a14="http://schemas.microsoft.com/office/drawing/2010/main">
                 <a:solidFill>
                   <a:srgbClr val="FFFFFF"/>
                 </a:solidFill>
               </a14:hiddenFill>
             </a:ext>
             <a:ext uri="{91240B29-F687-4f45-9708-019B960494DF}">
-              <a14:hiddenLine xmlns:a14="http://schemas.microsoft.com/office/drawing/2010/main" xmlns="" w="9525">
+              <a14:hiddenLine xmlns="" xmlns:a14="http://schemas.microsoft.com/office/drawing/2010/main" w="9525">
                 <a:solidFill>
                   <a:srgbClr val="000000"/>
                 </a:solidFill>
@@ -8144,14 +8144,14 @@
           </a:ln>
           <a:extLst>
             <a:ext uri="{909E8E84-426E-40dd-AFC4-6F175D3DCCD1}">
-              <a14:hiddenFill xmlns:a14="http://schemas.microsoft.com/office/drawing/2010/main" xmlns="">
+              <a14:hiddenFill xmlns="" xmlns:a14="http://schemas.microsoft.com/office/drawing/2010/main">
                 <a:solidFill>
                   <a:srgbClr val="FFFFFF"/>
                 </a:solidFill>
               </a14:hiddenFill>
             </a:ext>
             <a:ext uri="{91240B29-F687-4f45-9708-019B960494DF}">
-              <a14:hiddenLine xmlns:a14="http://schemas.microsoft.com/office/drawing/2010/main" xmlns="" w="9525">
+              <a14:hiddenLine xmlns="" xmlns:a14="http://schemas.microsoft.com/office/drawing/2010/main" w="9525">
                 <a:solidFill>
                   <a:srgbClr val="000000"/>
                 </a:solidFill>
@@ -9112,14 +9112,14 @@
           </a:ln>
           <a:extLst>
             <a:ext uri="{909E8E84-426E-40dd-AFC4-6F175D3DCCD1}">
-              <a14:hiddenFill xmlns:a14="http://schemas.microsoft.com/office/drawing/2010/main" xmlns="">
+              <a14:hiddenFill xmlns="" xmlns:a14="http://schemas.microsoft.com/office/drawing/2010/main">
                 <a:solidFill>
                   <a:srgbClr val="FFFFFF"/>
                 </a:solidFill>
               </a14:hiddenFill>
             </a:ext>
             <a:ext uri="{91240B29-F687-4f45-9708-019B960494DF}">
-              <a14:hiddenLine xmlns:a14="http://schemas.microsoft.com/office/drawing/2010/main" xmlns="" w="9525">
+              <a14:hiddenLine xmlns="" xmlns:a14="http://schemas.microsoft.com/office/drawing/2010/main" w="9525">
                 <a:solidFill>
                   <a:srgbClr val="000000"/>
                 </a:solidFill>
@@ -9881,14 +9881,14 @@
           </a:ln>
           <a:extLst>
             <a:ext uri="{909E8E84-426E-40dd-AFC4-6F175D3DCCD1}">
-              <a14:hiddenFill xmlns:a14="http://schemas.microsoft.com/office/drawing/2010/main" xmlns="">
+              <a14:hiddenFill xmlns="" xmlns:a14="http://schemas.microsoft.com/office/drawing/2010/main">
                 <a:solidFill>
                   <a:srgbClr val="FFFFFF"/>
                 </a:solidFill>
               </a14:hiddenFill>
             </a:ext>
             <a:ext uri="{91240B29-F687-4f45-9708-019B960494DF}">
-              <a14:hiddenLine xmlns:a14="http://schemas.microsoft.com/office/drawing/2010/main" xmlns="" w="9525">
+              <a14:hiddenLine xmlns="" xmlns:a14="http://schemas.microsoft.com/office/drawing/2010/main" w="9525">
                 <a:solidFill>
                   <a:srgbClr val="000000"/>
                 </a:solidFill>
@@ -11264,15 +11264,15 @@
             </a:r>
             <a:r>
               <a:rPr lang="en-US" sz="3600" dirty="0" err="1" smtClean="0"/>
-              <a:t>ServerSpec</a:t>
-            </a:r>
-            <a:r>
-              <a:rPr lang="en-US" sz="3600" dirty="0"/>
-              <a:t> </a:t>
+              <a:t>InSpec</a:t>
             </a:r>
             <a:r>
               <a:rPr lang="en-US" sz="3600" dirty="0" smtClean="0"/>
-              <a:t>in a test-driven development workflow.</a:t>
+              <a:t> in </a:t>
+            </a:r>
+            <a:r>
+              <a:rPr lang="en-US" sz="3600" dirty="0" smtClean="0"/>
+              <a:t>a test-driven development workflow.</a:t>
             </a:r>
           </a:p>
           <a:p>

</xml_diff>

<commit_message>
Updates course to Chef DK 1.3.40
* Updates all the paths for the test directory from:
  'test/recipes' to 'test/smoke/default'

* Updates all the footers to 2017
* Updates notes page format to releasable format

Signed-off-by: Franklin Webber <franklin@chef.io>
</commit_message>
<xml_diff>
--- a/01-introduction.pptx
+++ b/01-introduction.pptx
@@ -237,6 +237,10 @@
             <a:pPr>
               <a:defRPr/>
             </a:pPr>
+            <a:r>
+              <a:rPr lang="en-US" smtClean="0"/>
+              <a:t>Test Driven Cookbook Development</a:t>
+            </a:r>
             <a:endParaRPr lang="en-US"/>
           </a:p>
         </p:txBody>
@@ -281,13 +285,10 @@
             <a:pPr>
               <a:defRPr/>
             </a:pPr>
-            <a:fld id="{04CB1577-BF96-2D40-B4CA-2BF6DA80CBA7}" type="datetime1">
-              <a:rPr lang="en-CA"/>
-              <a:pPr>
-                <a:defRPr/>
-              </a:pPr>
-              <a:t>2016-08-29</a:t>
-            </a:fld>
+            <a:r>
+              <a:rPr lang="en-US" smtClean="0"/>
+              <a:t>Chef Software, Inc.</a:t>
+            </a:r>
             <a:endParaRPr lang="en-US" dirty="0"/>
           </a:p>
         </p:txBody>
@@ -398,7 +399,7 @@
     </p:extLst>
   </p:cSld>
   <p:clrMap bg1="lt1" tx1="dk1" bg2="lt2" tx2="dk2" accent1="accent1" accent2="accent2" accent3="accent3" accent4="accent4" accent5="accent5" accent6="accent6" hlink="hlink" folHlink="folHlink"/>
-  <p:hf dt="0"/>
+  <p:hf sldNum="0" ftr="0"/>
 </p:handoutMaster>
 </file>
 
@@ -436,7 +437,7 @@
         </p:nvSpPr>
         <p:spPr>
           <a:xfrm>
-            <a:off x="3884613" y="0"/>
+            <a:off x="3884613" y="108860"/>
             <a:ext cx="2971800" cy="457200"/>
           </a:xfrm>
           <a:prstGeom prst="rect">
@@ -464,13 +465,10 @@
             <a:pPr>
               <a:defRPr/>
             </a:pPr>
-            <a:fld id="{72FDBE47-C34F-CF4A-9709-1411AD5B3286}" type="datetime1">
-              <a:rPr lang="en-CA"/>
-              <a:pPr>
-                <a:defRPr/>
-              </a:pPr>
-              <a:t>2016-08-29</a:t>
-            </a:fld>
+            <a:r>
+              <a:rPr lang="en-US" smtClean="0"/>
+              <a:t>Chef Software, Inc.</a:t>
+            </a:r>
             <a:endParaRPr lang="en-US" dirty="0"/>
           </a:p>
         </p:txBody>
@@ -521,8 +519,8 @@
         </p:nvSpPr>
         <p:spPr>
           <a:xfrm>
-            <a:off x="685800" y="4343400"/>
-            <a:ext cx="5486400" cy="4114800"/>
+            <a:off x="381000" y="4343399"/>
+            <a:ext cx="6096000" cy="4474029"/>
           </a:xfrm>
           <a:prstGeom prst="rect">
             <a:avLst/>
@@ -573,68 +571,17 @@
       </p:sp>
       <p:sp>
         <p:nvSpPr>
-          <p:cNvPr id="7" name="Slide Number Placeholder 6"/>
-          <p:cNvSpPr>
-            <a:spLocks noGrp="1"/>
-          </p:cNvSpPr>
-          <p:nvPr>
-            <p:ph type="sldNum" sz="quarter" idx="5"/>
+          <p:cNvPr id="8" name="Header Placeholder 1"/>
+          <p:cNvSpPr>
+            <a:spLocks noGrp="1"/>
+          </p:cNvSpPr>
+          <p:nvPr>
+            <p:ph type="hdr" sz="quarter"/>
           </p:nvPr>
         </p:nvSpPr>
         <p:spPr>
           <a:xfrm>
-            <a:off x="6172200" y="8685213"/>
-            <a:ext cx="684213" cy="457200"/>
-          </a:xfrm>
-          <a:prstGeom prst="rect">
-            <a:avLst/>
-          </a:prstGeom>
-        </p:spPr>
-        <p:txBody>
-          <a:bodyPr vert="horz" lIns="91440" tIns="45720" rIns="91440" bIns="45720" rtlCol="0" anchor="b"/>
-          <a:lstStyle>
-            <a:lvl1pPr algn="r" defTabSz="1219120" fontAlgn="auto">
-              <a:spcBef>
-                <a:spcPts val="0"/>
-              </a:spcBef>
-              <a:spcAft>
-                <a:spcPts val="0"/>
-              </a:spcAft>
-              <a:defRPr sz="1200" smtClean="0">
-                <a:latin typeface="Arial" panose="020B0604020202020204" pitchFamily="34" charset="0"/>
-                <a:ea typeface="+mn-ea"/>
-                <a:cs typeface="Arial" panose="020B0604020202020204" pitchFamily="34" charset="0"/>
-              </a:defRPr>
-            </a:lvl1pPr>
-          </a:lstStyle>
-          <a:p>
-            <a:pPr>
-              <a:defRPr/>
-            </a:pPr>
-            <a:fld id="{DC3734AA-3150-D947-AC52-2F5DF48BFCD5}" type="slidenum">
-              <a:rPr lang="en-US"/>
-              <a:pPr>
-                <a:defRPr/>
-              </a:pPr>
-              <a:t>‹#›</a:t>
-            </a:fld>
-            <a:endParaRPr lang="en-US" dirty="0"/>
-          </a:p>
-        </p:txBody>
-      </p:sp>
-      <p:sp>
-        <p:nvSpPr>
-          <p:cNvPr id="8" name="Header Placeholder 1"/>
-          <p:cNvSpPr>
-            <a:spLocks noGrp="1"/>
-          </p:cNvSpPr>
-          <p:nvPr>
-            <p:ph type="hdr" sz="quarter"/>
-          </p:nvPr>
-        </p:nvSpPr>
-        <p:spPr>
-          <a:xfrm>
-            <a:off x="0" y="0"/>
+            <a:off x="0" y="108860"/>
             <a:ext cx="2971800" cy="457200"/>
           </a:xfrm>
           <a:prstGeom prst="rect">
@@ -662,53 +609,10 @@
             <a:pPr>
               <a:defRPr/>
             </a:pPr>
-            <a:endParaRPr lang="en-US"/>
-          </a:p>
-        </p:txBody>
-      </p:sp>
-      <p:sp>
-        <p:nvSpPr>
-          <p:cNvPr id="9" name="Footer Placeholder 3"/>
-          <p:cNvSpPr>
-            <a:spLocks noGrp="1"/>
-          </p:cNvSpPr>
-          <p:nvPr>
-            <p:ph type="ftr" sz="quarter" idx="4"/>
-          </p:nvPr>
-        </p:nvSpPr>
-        <p:spPr>
-          <a:xfrm>
-            <a:off x="0" y="8685213"/>
-            <a:ext cx="6248400" cy="457200"/>
-          </a:xfrm>
-          <a:prstGeom prst="rect">
-            <a:avLst/>
-          </a:prstGeom>
-        </p:spPr>
-        <p:txBody>
-          <a:bodyPr vert="horz" lIns="91440" tIns="45720" rIns="91440" bIns="45720" rtlCol="0" anchor="b"/>
-          <a:lstStyle>
-            <a:lvl1pPr algn="l" defTabSz="1219120" fontAlgn="auto">
-              <a:spcBef>
-                <a:spcPts val="0"/>
-              </a:spcBef>
-              <a:spcAft>
-                <a:spcPts val="0"/>
-              </a:spcAft>
-              <a:defRPr sz="900" dirty="0" smtClean="0">
-                <a:solidFill>
-                  <a:srgbClr val="000000"/>
-                </a:solidFill>
-                <a:latin typeface="Arial" panose="020B0604020202020204" pitchFamily="34" charset="0"/>
-                <a:ea typeface="+mn-ea"/>
-                <a:cs typeface="Arial" panose="020B0604020202020204" pitchFamily="34" charset="0"/>
-              </a:defRPr>
-            </a:lvl1pPr>
-          </a:lstStyle>
-          <a:p>
-            <a:pPr>
-              <a:defRPr/>
-            </a:pPr>
+            <a:r>
+              <a:rPr lang="en-US" smtClean="0"/>
+              <a:t>Test Driven Cookbook Development</a:t>
+            </a:r>
             <a:endParaRPr lang="en-US"/>
           </a:p>
         </p:txBody>
@@ -721,7 +625,7 @@
     </p:extLst>
   </p:cSld>
   <p:clrMap bg1="lt1" tx1="dk1" bg2="lt2" tx2="dk2" accent1="accent1" accent2="accent2" accent3="accent3" accent4="accent4" accent5="accent5" accent6="accent6" hlink="hlink" folHlink="folHlink"/>
-  <p:hf dt="0"/>
+  <p:hf sldNum="0" ftr="0"/>
   <p:notesStyle>
     <a:lvl1pPr algn="l" defTabSz="1217613" rtl="0" fontAlgn="base">
       <a:lnSpc>
@@ -924,12 +828,12 @@
       </p:sp>
       <p:sp>
         <p:nvSpPr>
-          <p:cNvPr id="4" name="Slide Number Placeholder 3"/>
-          <p:cNvSpPr>
-            <a:spLocks noGrp="1"/>
-          </p:cNvSpPr>
-          <p:nvPr>
-            <p:ph type="sldNum" sz="quarter" idx="10"/>
+          <p:cNvPr id="5" name="Header Placeholder 4"/>
+          <p:cNvSpPr>
+            <a:spLocks noGrp="1"/>
+          </p:cNvSpPr>
+          <p:nvPr>
+            <p:ph type="hdr" sz="quarter" idx="11"/>
           </p:nvPr>
         </p:nvSpPr>
         <p:spPr/>
@@ -940,25 +844,22 @@
             <a:pPr>
               <a:defRPr/>
             </a:pPr>
-            <a:fld id="{DC3734AA-3150-D947-AC52-2F5DF48BFCD5}" type="slidenum">
+            <a:r>
               <a:rPr lang="en-US" smtClean="0"/>
-              <a:pPr>
-                <a:defRPr/>
-              </a:pPr>
-              <a:t>1</a:t>
-            </a:fld>
-            <a:endParaRPr lang="en-US" dirty="0"/>
-          </a:p>
-        </p:txBody>
-      </p:sp>
-      <p:sp>
-        <p:nvSpPr>
-          <p:cNvPr id="5" name="Header Placeholder 4"/>
-          <p:cNvSpPr>
-            <a:spLocks noGrp="1"/>
-          </p:cNvSpPr>
-          <p:nvPr>
-            <p:ph type="hdr" sz="quarter" idx="11"/>
+              <a:t>Test Driven Cookbook Development</a:t>
+            </a:r>
+            <a:endParaRPr lang="en-US"/>
+          </a:p>
+        </p:txBody>
+      </p:sp>
+      <p:sp>
+        <p:nvSpPr>
+          <p:cNvPr id="7" name="Date Placeholder 6"/>
+          <p:cNvSpPr>
+            <a:spLocks noGrp="1"/>
+          </p:cNvSpPr>
+          <p:nvPr>
+            <p:ph type="dt" idx="13"/>
           </p:nvPr>
         </p:nvSpPr>
         <p:spPr/>
@@ -969,29 +870,11 @@
             <a:pPr>
               <a:defRPr/>
             </a:pPr>
-            <a:endParaRPr lang="en-US"/>
-          </a:p>
-        </p:txBody>
-      </p:sp>
-      <p:sp>
-        <p:nvSpPr>
-          <p:cNvPr id="6" name="Footer Placeholder 5"/>
-          <p:cNvSpPr>
-            <a:spLocks noGrp="1"/>
-          </p:cNvSpPr>
-          <p:nvPr>
-            <p:ph type="ftr" sz="quarter" idx="12"/>
-          </p:nvPr>
-        </p:nvSpPr>
-        <p:spPr/>
-        <p:txBody>
-          <a:bodyPr/>
-          <a:lstStyle/>
-          <a:p>
-            <a:pPr>
-              <a:defRPr/>
-            </a:pPr>
-            <a:endParaRPr lang="en-US"/>
+            <a:r>
+              <a:rPr lang="en-US" smtClean="0"/>
+              <a:t>Chef Software, Inc.</a:t>
+            </a:r>
+            <a:endParaRPr lang="en-US" dirty="0"/>
           </a:p>
         </p:txBody>
       </p:sp>
@@ -1083,12 +966,12 @@
       </p:sp>
       <p:sp>
         <p:nvSpPr>
-          <p:cNvPr id="4" name="Slide Number Placeholder 3"/>
-          <p:cNvSpPr>
-            <a:spLocks noGrp="1"/>
-          </p:cNvSpPr>
-          <p:nvPr>
-            <p:ph type="sldNum" sz="quarter" idx="10"/>
+          <p:cNvPr id="5" name="Header Placeholder 4"/>
+          <p:cNvSpPr>
+            <a:spLocks noGrp="1"/>
+          </p:cNvSpPr>
+          <p:nvPr>
+            <p:ph type="hdr" sz="quarter" idx="11"/>
           </p:nvPr>
         </p:nvSpPr>
         <p:spPr/>
@@ -1099,25 +982,22 @@
             <a:pPr>
               <a:defRPr/>
             </a:pPr>
-            <a:fld id="{DC3734AA-3150-D947-AC52-2F5DF48BFCD5}" type="slidenum">
+            <a:r>
               <a:rPr lang="en-US" smtClean="0"/>
-              <a:pPr>
-                <a:defRPr/>
-              </a:pPr>
-              <a:t>10</a:t>
-            </a:fld>
-            <a:endParaRPr lang="en-US" dirty="0"/>
-          </a:p>
-        </p:txBody>
-      </p:sp>
-      <p:sp>
-        <p:nvSpPr>
-          <p:cNvPr id="5" name="Header Placeholder 4"/>
-          <p:cNvSpPr>
-            <a:spLocks noGrp="1"/>
-          </p:cNvSpPr>
-          <p:nvPr>
-            <p:ph type="hdr" sz="quarter" idx="11"/>
+              <a:t>Test Driven Cookbook Development</a:t>
+            </a:r>
+            <a:endParaRPr lang="en-US"/>
+          </a:p>
+        </p:txBody>
+      </p:sp>
+      <p:sp>
+        <p:nvSpPr>
+          <p:cNvPr id="7" name="Date Placeholder 6"/>
+          <p:cNvSpPr>
+            <a:spLocks noGrp="1"/>
+          </p:cNvSpPr>
+          <p:nvPr>
+            <p:ph type="dt" idx="13"/>
           </p:nvPr>
         </p:nvSpPr>
         <p:spPr/>
@@ -1128,29 +1008,11 @@
             <a:pPr>
               <a:defRPr/>
             </a:pPr>
-            <a:endParaRPr lang="en-US"/>
-          </a:p>
-        </p:txBody>
-      </p:sp>
-      <p:sp>
-        <p:nvSpPr>
-          <p:cNvPr id="6" name="Footer Placeholder 5"/>
-          <p:cNvSpPr>
-            <a:spLocks noGrp="1"/>
-          </p:cNvSpPr>
-          <p:nvPr>
-            <p:ph type="ftr" sz="quarter" idx="12"/>
-          </p:nvPr>
-        </p:nvSpPr>
-        <p:spPr/>
-        <p:txBody>
-          <a:bodyPr/>
-          <a:lstStyle/>
-          <a:p>
-            <a:pPr>
-              <a:defRPr/>
-            </a:pPr>
-            <a:endParaRPr lang="en-US"/>
+            <a:r>
+              <a:rPr lang="en-US" smtClean="0"/>
+              <a:t>Chef Software, Inc.</a:t>
+            </a:r>
+            <a:endParaRPr lang="en-US" dirty="0"/>
           </a:p>
         </p:txBody>
       </p:sp>
@@ -1238,12 +1100,12 @@
       </p:sp>
       <p:sp>
         <p:nvSpPr>
-          <p:cNvPr id="4" name="Slide Number Placeholder 3"/>
-          <p:cNvSpPr>
-            <a:spLocks noGrp="1"/>
-          </p:cNvSpPr>
-          <p:nvPr>
-            <p:ph type="sldNum" sz="quarter" idx="10"/>
+          <p:cNvPr id="5" name="Header Placeholder 4"/>
+          <p:cNvSpPr>
+            <a:spLocks noGrp="1"/>
+          </p:cNvSpPr>
+          <p:nvPr>
+            <p:ph type="hdr" sz="quarter" idx="11"/>
           </p:nvPr>
         </p:nvSpPr>
         <p:spPr/>
@@ -1254,25 +1116,22 @@
             <a:pPr>
               <a:defRPr/>
             </a:pPr>
-            <a:fld id="{DC3734AA-3150-D947-AC52-2F5DF48BFCD5}" type="slidenum">
+            <a:r>
               <a:rPr lang="en-US" smtClean="0"/>
-              <a:pPr>
-                <a:defRPr/>
-              </a:pPr>
-              <a:t>11</a:t>
-            </a:fld>
-            <a:endParaRPr lang="en-US" dirty="0"/>
-          </a:p>
-        </p:txBody>
-      </p:sp>
-      <p:sp>
-        <p:nvSpPr>
-          <p:cNvPr id="5" name="Header Placeholder 4"/>
-          <p:cNvSpPr>
-            <a:spLocks noGrp="1"/>
-          </p:cNvSpPr>
-          <p:nvPr>
-            <p:ph type="hdr" sz="quarter" idx="11"/>
+              <a:t>Test Driven Cookbook Development</a:t>
+            </a:r>
+            <a:endParaRPr lang="en-US"/>
+          </a:p>
+        </p:txBody>
+      </p:sp>
+      <p:sp>
+        <p:nvSpPr>
+          <p:cNvPr id="7" name="Date Placeholder 6"/>
+          <p:cNvSpPr>
+            <a:spLocks noGrp="1"/>
+          </p:cNvSpPr>
+          <p:nvPr>
+            <p:ph type="dt" idx="13"/>
           </p:nvPr>
         </p:nvSpPr>
         <p:spPr/>
@@ -1283,29 +1142,11 @@
             <a:pPr>
               <a:defRPr/>
             </a:pPr>
-            <a:endParaRPr lang="en-US"/>
-          </a:p>
-        </p:txBody>
-      </p:sp>
-      <p:sp>
-        <p:nvSpPr>
-          <p:cNvPr id="6" name="Footer Placeholder 5"/>
-          <p:cNvSpPr>
-            <a:spLocks noGrp="1"/>
-          </p:cNvSpPr>
-          <p:nvPr>
-            <p:ph type="ftr" sz="quarter" idx="12"/>
-          </p:nvPr>
-        </p:nvSpPr>
-        <p:spPr/>
-        <p:txBody>
-          <a:bodyPr/>
-          <a:lstStyle/>
-          <a:p>
-            <a:pPr>
-              <a:defRPr/>
-            </a:pPr>
-            <a:endParaRPr lang="en-US"/>
+            <a:r>
+              <a:rPr lang="en-US" smtClean="0"/>
+              <a:t>Chef Software, Inc.</a:t>
+            </a:r>
+            <a:endParaRPr lang="en-US" dirty="0"/>
           </a:p>
         </p:txBody>
       </p:sp>
@@ -1384,12 +1225,12 @@
       </p:sp>
       <p:sp>
         <p:nvSpPr>
-          <p:cNvPr id="4" name="Slide Number Placeholder 3"/>
-          <p:cNvSpPr>
-            <a:spLocks noGrp="1"/>
-          </p:cNvSpPr>
-          <p:nvPr>
-            <p:ph type="sldNum" sz="quarter" idx="10"/>
+          <p:cNvPr id="5" name="Header Placeholder 4"/>
+          <p:cNvSpPr>
+            <a:spLocks noGrp="1"/>
+          </p:cNvSpPr>
+          <p:nvPr>
+            <p:ph type="hdr" sz="quarter" idx="11"/>
           </p:nvPr>
         </p:nvSpPr>
         <p:spPr/>
@@ -1400,25 +1241,22 @@
             <a:pPr>
               <a:defRPr/>
             </a:pPr>
-            <a:fld id="{DC3734AA-3150-D947-AC52-2F5DF48BFCD5}" type="slidenum">
+            <a:r>
               <a:rPr lang="en-US" smtClean="0"/>
-              <a:pPr>
-                <a:defRPr/>
-              </a:pPr>
-              <a:t>12</a:t>
-            </a:fld>
-            <a:endParaRPr lang="en-US" dirty="0"/>
-          </a:p>
-        </p:txBody>
-      </p:sp>
-      <p:sp>
-        <p:nvSpPr>
-          <p:cNvPr id="5" name="Header Placeholder 4"/>
-          <p:cNvSpPr>
-            <a:spLocks noGrp="1"/>
-          </p:cNvSpPr>
-          <p:nvPr>
-            <p:ph type="hdr" sz="quarter" idx="11"/>
+              <a:t>Test Driven Cookbook Development</a:t>
+            </a:r>
+            <a:endParaRPr lang="en-US"/>
+          </a:p>
+        </p:txBody>
+      </p:sp>
+      <p:sp>
+        <p:nvSpPr>
+          <p:cNvPr id="7" name="Date Placeholder 6"/>
+          <p:cNvSpPr>
+            <a:spLocks noGrp="1"/>
+          </p:cNvSpPr>
+          <p:nvPr>
+            <p:ph type="dt" idx="13"/>
           </p:nvPr>
         </p:nvSpPr>
         <p:spPr/>
@@ -1429,29 +1267,11 @@
             <a:pPr>
               <a:defRPr/>
             </a:pPr>
-            <a:endParaRPr lang="en-US"/>
-          </a:p>
-        </p:txBody>
-      </p:sp>
-      <p:sp>
-        <p:nvSpPr>
-          <p:cNvPr id="6" name="Footer Placeholder 5"/>
-          <p:cNvSpPr>
-            <a:spLocks noGrp="1"/>
-          </p:cNvSpPr>
-          <p:nvPr>
-            <p:ph type="ftr" sz="quarter" idx="12"/>
-          </p:nvPr>
-        </p:nvSpPr>
-        <p:spPr/>
-        <p:txBody>
-          <a:bodyPr/>
-          <a:lstStyle/>
-          <a:p>
-            <a:pPr>
-              <a:defRPr/>
-            </a:pPr>
-            <a:endParaRPr lang="en-US"/>
+            <a:r>
+              <a:rPr lang="en-US" smtClean="0"/>
+              <a:t>Chef Software, Inc.</a:t>
+            </a:r>
+            <a:endParaRPr lang="en-US" dirty="0"/>
           </a:p>
         </p:txBody>
       </p:sp>
@@ -1518,12 +1338,12 @@
       </p:sp>
       <p:sp>
         <p:nvSpPr>
-          <p:cNvPr id="4" name="Slide Number Placeholder 3"/>
-          <p:cNvSpPr>
-            <a:spLocks noGrp="1"/>
-          </p:cNvSpPr>
-          <p:nvPr>
-            <p:ph type="sldNum" sz="quarter" idx="10"/>
+          <p:cNvPr id="5" name="Header Placeholder 4"/>
+          <p:cNvSpPr>
+            <a:spLocks noGrp="1"/>
+          </p:cNvSpPr>
+          <p:nvPr>
+            <p:ph type="hdr" sz="quarter" idx="11"/>
           </p:nvPr>
         </p:nvSpPr>
         <p:spPr/>
@@ -1534,25 +1354,22 @@
             <a:pPr>
               <a:defRPr/>
             </a:pPr>
-            <a:fld id="{DC3734AA-3150-D947-AC52-2F5DF48BFCD5}" type="slidenum">
+            <a:r>
               <a:rPr lang="en-US" smtClean="0"/>
-              <a:pPr>
-                <a:defRPr/>
-              </a:pPr>
-              <a:t>13</a:t>
-            </a:fld>
-            <a:endParaRPr lang="en-US" dirty="0"/>
-          </a:p>
-        </p:txBody>
-      </p:sp>
-      <p:sp>
-        <p:nvSpPr>
-          <p:cNvPr id="5" name="Header Placeholder 4"/>
-          <p:cNvSpPr>
-            <a:spLocks noGrp="1"/>
-          </p:cNvSpPr>
-          <p:nvPr>
-            <p:ph type="hdr" sz="quarter" idx="11"/>
+              <a:t>Test Driven Cookbook Development</a:t>
+            </a:r>
+            <a:endParaRPr lang="en-US"/>
+          </a:p>
+        </p:txBody>
+      </p:sp>
+      <p:sp>
+        <p:nvSpPr>
+          <p:cNvPr id="7" name="Date Placeholder 6"/>
+          <p:cNvSpPr>
+            <a:spLocks noGrp="1"/>
+          </p:cNvSpPr>
+          <p:nvPr>
+            <p:ph type="dt" idx="13"/>
           </p:nvPr>
         </p:nvSpPr>
         <p:spPr/>
@@ -1563,29 +1380,11 @@
             <a:pPr>
               <a:defRPr/>
             </a:pPr>
-            <a:endParaRPr lang="en-US"/>
-          </a:p>
-        </p:txBody>
-      </p:sp>
-      <p:sp>
-        <p:nvSpPr>
-          <p:cNvPr id="6" name="Footer Placeholder 5"/>
-          <p:cNvSpPr>
-            <a:spLocks noGrp="1"/>
-          </p:cNvSpPr>
-          <p:nvPr>
-            <p:ph type="ftr" sz="quarter" idx="12"/>
-          </p:nvPr>
-        </p:nvSpPr>
-        <p:spPr/>
-        <p:txBody>
-          <a:bodyPr/>
-          <a:lstStyle/>
-          <a:p>
-            <a:pPr>
-              <a:defRPr/>
-            </a:pPr>
-            <a:endParaRPr lang="en-US"/>
+            <a:r>
+              <a:rPr lang="en-US" smtClean="0"/>
+              <a:t>Chef Software, Inc.</a:t>
+            </a:r>
+            <a:endParaRPr lang="en-US" dirty="0"/>
           </a:p>
         </p:txBody>
       </p:sp>
@@ -1669,12 +1468,12 @@
       </p:sp>
       <p:sp>
         <p:nvSpPr>
-          <p:cNvPr id="4" name="Slide Number Placeholder 3"/>
-          <p:cNvSpPr>
-            <a:spLocks noGrp="1"/>
-          </p:cNvSpPr>
-          <p:nvPr>
-            <p:ph type="sldNum" sz="quarter" idx="10"/>
+          <p:cNvPr id="5" name="Header Placeholder 4"/>
+          <p:cNvSpPr>
+            <a:spLocks noGrp="1"/>
+          </p:cNvSpPr>
+          <p:nvPr>
+            <p:ph type="hdr" sz="quarter" idx="11"/>
           </p:nvPr>
         </p:nvSpPr>
         <p:spPr/>
@@ -1685,25 +1484,22 @@
             <a:pPr>
               <a:defRPr/>
             </a:pPr>
-            <a:fld id="{DC3734AA-3150-D947-AC52-2F5DF48BFCD5}" type="slidenum">
+            <a:r>
               <a:rPr lang="en-US" smtClean="0"/>
-              <a:pPr>
-                <a:defRPr/>
-              </a:pPr>
-              <a:t>2</a:t>
-            </a:fld>
-            <a:endParaRPr lang="en-US" dirty="0"/>
-          </a:p>
-        </p:txBody>
-      </p:sp>
-      <p:sp>
-        <p:nvSpPr>
-          <p:cNvPr id="5" name="Header Placeholder 4"/>
-          <p:cNvSpPr>
-            <a:spLocks noGrp="1"/>
-          </p:cNvSpPr>
-          <p:nvPr>
-            <p:ph type="hdr" sz="quarter" idx="11"/>
+              <a:t>Test Driven Cookbook Development</a:t>
+            </a:r>
+            <a:endParaRPr lang="en-US"/>
+          </a:p>
+        </p:txBody>
+      </p:sp>
+      <p:sp>
+        <p:nvSpPr>
+          <p:cNvPr id="7" name="Date Placeholder 6"/>
+          <p:cNvSpPr>
+            <a:spLocks noGrp="1"/>
+          </p:cNvSpPr>
+          <p:nvPr>
+            <p:ph type="dt" idx="13"/>
           </p:nvPr>
         </p:nvSpPr>
         <p:spPr/>
@@ -1714,29 +1510,11 @@
             <a:pPr>
               <a:defRPr/>
             </a:pPr>
-            <a:endParaRPr lang="en-US"/>
-          </a:p>
-        </p:txBody>
-      </p:sp>
-      <p:sp>
-        <p:nvSpPr>
-          <p:cNvPr id="6" name="Footer Placeholder 5"/>
-          <p:cNvSpPr>
-            <a:spLocks noGrp="1"/>
-          </p:cNvSpPr>
-          <p:nvPr>
-            <p:ph type="ftr" sz="quarter" idx="12"/>
-          </p:nvPr>
-        </p:nvSpPr>
-        <p:spPr/>
-        <p:txBody>
-          <a:bodyPr/>
-          <a:lstStyle/>
-          <a:p>
-            <a:pPr>
-              <a:defRPr/>
-            </a:pPr>
-            <a:endParaRPr lang="en-US"/>
+            <a:r>
+              <a:rPr lang="en-US" smtClean="0"/>
+              <a:t>Chef Software, Inc.</a:t>
+            </a:r>
+            <a:endParaRPr lang="en-US" dirty="0"/>
           </a:p>
         </p:txBody>
       </p:sp>
@@ -1816,12 +1594,12 @@
       </p:sp>
       <p:sp>
         <p:nvSpPr>
-          <p:cNvPr id="4" name="Slide Number Placeholder 3"/>
-          <p:cNvSpPr>
-            <a:spLocks noGrp="1"/>
-          </p:cNvSpPr>
-          <p:nvPr>
-            <p:ph type="sldNum" sz="quarter" idx="10"/>
+          <p:cNvPr id="5" name="Header Placeholder 4"/>
+          <p:cNvSpPr>
+            <a:spLocks noGrp="1"/>
+          </p:cNvSpPr>
+          <p:nvPr>
+            <p:ph type="hdr" sz="quarter" idx="11"/>
           </p:nvPr>
         </p:nvSpPr>
         <p:spPr/>
@@ -1832,25 +1610,22 @@
             <a:pPr>
               <a:defRPr/>
             </a:pPr>
-            <a:fld id="{DC3734AA-3150-D947-AC52-2F5DF48BFCD5}" type="slidenum">
+            <a:r>
               <a:rPr lang="en-US" smtClean="0"/>
-              <a:pPr>
-                <a:defRPr/>
-              </a:pPr>
-              <a:t>3</a:t>
-            </a:fld>
-            <a:endParaRPr lang="en-US" dirty="0"/>
-          </a:p>
-        </p:txBody>
-      </p:sp>
-      <p:sp>
-        <p:nvSpPr>
-          <p:cNvPr id="5" name="Header Placeholder 4"/>
-          <p:cNvSpPr>
-            <a:spLocks noGrp="1"/>
-          </p:cNvSpPr>
-          <p:nvPr>
-            <p:ph type="hdr" sz="quarter" idx="11"/>
+              <a:t>Test Driven Cookbook Development</a:t>
+            </a:r>
+            <a:endParaRPr lang="en-US"/>
+          </a:p>
+        </p:txBody>
+      </p:sp>
+      <p:sp>
+        <p:nvSpPr>
+          <p:cNvPr id="7" name="Date Placeholder 6"/>
+          <p:cNvSpPr>
+            <a:spLocks noGrp="1"/>
+          </p:cNvSpPr>
+          <p:nvPr>
+            <p:ph type="dt" idx="13"/>
           </p:nvPr>
         </p:nvSpPr>
         <p:spPr/>
@@ -1861,29 +1636,11 @@
             <a:pPr>
               <a:defRPr/>
             </a:pPr>
-            <a:endParaRPr lang="en-US"/>
-          </a:p>
-        </p:txBody>
-      </p:sp>
-      <p:sp>
-        <p:nvSpPr>
-          <p:cNvPr id="6" name="Footer Placeholder 5"/>
-          <p:cNvSpPr>
-            <a:spLocks noGrp="1"/>
-          </p:cNvSpPr>
-          <p:nvPr>
-            <p:ph type="ftr" sz="quarter" idx="12"/>
-          </p:nvPr>
-        </p:nvSpPr>
-        <p:spPr/>
-        <p:txBody>
-          <a:bodyPr/>
-          <a:lstStyle/>
-          <a:p>
-            <a:pPr>
-              <a:defRPr/>
-            </a:pPr>
-            <a:endParaRPr lang="en-US"/>
+            <a:r>
+              <a:rPr lang="en-US" smtClean="0"/>
+              <a:t>Chef Software, Inc.</a:t>
+            </a:r>
+            <a:endParaRPr lang="en-US" dirty="0"/>
           </a:p>
         </p:txBody>
       </p:sp>
@@ -1966,12 +1723,12 @@
       </p:sp>
       <p:sp>
         <p:nvSpPr>
-          <p:cNvPr id="4" name="Slide Number Placeholder 3"/>
-          <p:cNvSpPr>
-            <a:spLocks noGrp="1"/>
-          </p:cNvSpPr>
-          <p:nvPr>
-            <p:ph type="sldNum" sz="quarter" idx="10"/>
+          <p:cNvPr id="5" name="Header Placeholder 4"/>
+          <p:cNvSpPr>
+            <a:spLocks noGrp="1"/>
+          </p:cNvSpPr>
+          <p:nvPr>
+            <p:ph type="hdr" sz="quarter" idx="11"/>
           </p:nvPr>
         </p:nvSpPr>
         <p:spPr/>
@@ -1982,25 +1739,22 @@
             <a:pPr>
               <a:defRPr/>
             </a:pPr>
-            <a:fld id="{DC3734AA-3150-D947-AC52-2F5DF48BFCD5}" type="slidenum">
+            <a:r>
               <a:rPr lang="en-US" smtClean="0"/>
-              <a:pPr>
-                <a:defRPr/>
-              </a:pPr>
-              <a:t>4</a:t>
-            </a:fld>
-            <a:endParaRPr lang="en-US" dirty="0"/>
-          </a:p>
-        </p:txBody>
-      </p:sp>
-      <p:sp>
-        <p:nvSpPr>
-          <p:cNvPr id="5" name="Header Placeholder 4"/>
-          <p:cNvSpPr>
-            <a:spLocks noGrp="1"/>
-          </p:cNvSpPr>
-          <p:nvPr>
-            <p:ph type="hdr" sz="quarter" idx="11"/>
+              <a:t>Test Driven Cookbook Development</a:t>
+            </a:r>
+            <a:endParaRPr lang="en-US"/>
+          </a:p>
+        </p:txBody>
+      </p:sp>
+      <p:sp>
+        <p:nvSpPr>
+          <p:cNvPr id="7" name="Date Placeholder 6"/>
+          <p:cNvSpPr>
+            <a:spLocks noGrp="1"/>
+          </p:cNvSpPr>
+          <p:nvPr>
+            <p:ph type="dt" idx="13"/>
           </p:nvPr>
         </p:nvSpPr>
         <p:spPr/>
@@ -2011,29 +1765,11 @@
             <a:pPr>
               <a:defRPr/>
             </a:pPr>
-            <a:endParaRPr lang="en-US"/>
-          </a:p>
-        </p:txBody>
-      </p:sp>
-      <p:sp>
-        <p:nvSpPr>
-          <p:cNvPr id="6" name="Footer Placeholder 5"/>
-          <p:cNvSpPr>
-            <a:spLocks noGrp="1"/>
-          </p:cNvSpPr>
-          <p:nvPr>
-            <p:ph type="ftr" sz="quarter" idx="12"/>
-          </p:nvPr>
-        </p:nvSpPr>
-        <p:spPr/>
-        <p:txBody>
-          <a:bodyPr/>
-          <a:lstStyle/>
-          <a:p>
-            <a:pPr>
-              <a:defRPr/>
-            </a:pPr>
-            <a:endParaRPr lang="en-US"/>
+            <a:r>
+              <a:rPr lang="en-US" smtClean="0"/>
+              <a:t>Chef Software, Inc.</a:t>
+            </a:r>
+            <a:endParaRPr lang="en-US" dirty="0"/>
           </a:p>
         </p:txBody>
       </p:sp>
@@ -2107,12 +1843,12 @@
       </p:sp>
       <p:sp>
         <p:nvSpPr>
-          <p:cNvPr id="4" name="Slide Number Placeholder 3"/>
-          <p:cNvSpPr>
-            <a:spLocks noGrp="1"/>
-          </p:cNvSpPr>
-          <p:nvPr>
-            <p:ph type="sldNum" sz="quarter" idx="10"/>
+          <p:cNvPr id="5" name="Header Placeholder 4"/>
+          <p:cNvSpPr>
+            <a:spLocks noGrp="1"/>
+          </p:cNvSpPr>
+          <p:nvPr>
+            <p:ph type="hdr" sz="quarter" idx="11"/>
           </p:nvPr>
         </p:nvSpPr>
         <p:spPr/>
@@ -2123,25 +1859,22 @@
             <a:pPr>
               <a:defRPr/>
             </a:pPr>
-            <a:fld id="{DC3734AA-3150-D947-AC52-2F5DF48BFCD5}" type="slidenum">
+            <a:r>
               <a:rPr lang="en-US" smtClean="0"/>
-              <a:pPr>
-                <a:defRPr/>
-              </a:pPr>
-              <a:t>5</a:t>
-            </a:fld>
-            <a:endParaRPr lang="en-US" dirty="0"/>
-          </a:p>
-        </p:txBody>
-      </p:sp>
-      <p:sp>
-        <p:nvSpPr>
-          <p:cNvPr id="5" name="Header Placeholder 4"/>
-          <p:cNvSpPr>
-            <a:spLocks noGrp="1"/>
-          </p:cNvSpPr>
-          <p:nvPr>
-            <p:ph type="hdr" sz="quarter" idx="11"/>
+              <a:t>Test Driven Cookbook Development</a:t>
+            </a:r>
+            <a:endParaRPr lang="en-US"/>
+          </a:p>
+        </p:txBody>
+      </p:sp>
+      <p:sp>
+        <p:nvSpPr>
+          <p:cNvPr id="7" name="Date Placeholder 6"/>
+          <p:cNvSpPr>
+            <a:spLocks noGrp="1"/>
+          </p:cNvSpPr>
+          <p:nvPr>
+            <p:ph type="dt" idx="13"/>
           </p:nvPr>
         </p:nvSpPr>
         <p:spPr/>
@@ -2152,29 +1885,11 @@
             <a:pPr>
               <a:defRPr/>
             </a:pPr>
-            <a:endParaRPr lang="en-US"/>
-          </a:p>
-        </p:txBody>
-      </p:sp>
-      <p:sp>
-        <p:nvSpPr>
-          <p:cNvPr id="6" name="Footer Placeholder 5"/>
-          <p:cNvSpPr>
-            <a:spLocks noGrp="1"/>
-          </p:cNvSpPr>
-          <p:nvPr>
-            <p:ph type="ftr" sz="quarter" idx="12"/>
-          </p:nvPr>
-        </p:nvSpPr>
-        <p:spPr/>
-        <p:txBody>
-          <a:bodyPr/>
-          <a:lstStyle/>
-          <a:p>
-            <a:pPr>
-              <a:defRPr/>
-            </a:pPr>
-            <a:endParaRPr lang="en-US"/>
+            <a:r>
+              <a:rPr lang="en-US" smtClean="0"/>
+              <a:t>Chef Software, Inc.</a:t>
+            </a:r>
+            <a:endParaRPr lang="en-US" dirty="0"/>
           </a:p>
         </p:txBody>
       </p:sp>
@@ -2249,12 +1964,12 @@
       </p:sp>
       <p:sp>
         <p:nvSpPr>
-          <p:cNvPr id="4" name="Slide Number Placeholder 3"/>
-          <p:cNvSpPr>
-            <a:spLocks noGrp="1"/>
-          </p:cNvSpPr>
-          <p:nvPr>
-            <p:ph type="sldNum" sz="quarter" idx="10"/>
+          <p:cNvPr id="5" name="Header Placeholder 4"/>
+          <p:cNvSpPr>
+            <a:spLocks noGrp="1"/>
+          </p:cNvSpPr>
+          <p:nvPr>
+            <p:ph type="hdr" sz="quarter" idx="11"/>
           </p:nvPr>
         </p:nvSpPr>
         <p:spPr/>
@@ -2265,25 +1980,22 @@
             <a:pPr>
               <a:defRPr/>
             </a:pPr>
-            <a:fld id="{DC3734AA-3150-D947-AC52-2F5DF48BFCD5}" type="slidenum">
+            <a:r>
               <a:rPr lang="en-US" smtClean="0"/>
-              <a:pPr>
-                <a:defRPr/>
-              </a:pPr>
-              <a:t>6</a:t>
-            </a:fld>
-            <a:endParaRPr lang="en-US" dirty="0"/>
-          </a:p>
-        </p:txBody>
-      </p:sp>
-      <p:sp>
-        <p:nvSpPr>
-          <p:cNvPr id="5" name="Header Placeholder 4"/>
-          <p:cNvSpPr>
-            <a:spLocks noGrp="1"/>
-          </p:cNvSpPr>
-          <p:nvPr>
-            <p:ph type="hdr" sz="quarter" idx="11"/>
+              <a:t>Test Driven Cookbook Development</a:t>
+            </a:r>
+            <a:endParaRPr lang="en-US"/>
+          </a:p>
+        </p:txBody>
+      </p:sp>
+      <p:sp>
+        <p:nvSpPr>
+          <p:cNvPr id="7" name="Date Placeholder 6"/>
+          <p:cNvSpPr>
+            <a:spLocks noGrp="1"/>
+          </p:cNvSpPr>
+          <p:nvPr>
+            <p:ph type="dt" idx="13"/>
           </p:nvPr>
         </p:nvSpPr>
         <p:spPr/>
@@ -2294,29 +2006,11 @@
             <a:pPr>
               <a:defRPr/>
             </a:pPr>
-            <a:endParaRPr lang="en-US"/>
-          </a:p>
-        </p:txBody>
-      </p:sp>
-      <p:sp>
-        <p:nvSpPr>
-          <p:cNvPr id="6" name="Footer Placeholder 5"/>
-          <p:cNvSpPr>
-            <a:spLocks noGrp="1"/>
-          </p:cNvSpPr>
-          <p:nvPr>
-            <p:ph type="ftr" sz="quarter" idx="12"/>
-          </p:nvPr>
-        </p:nvSpPr>
-        <p:spPr/>
-        <p:txBody>
-          <a:bodyPr/>
-          <a:lstStyle/>
-          <a:p>
-            <a:pPr>
-              <a:defRPr/>
-            </a:pPr>
-            <a:endParaRPr lang="en-US"/>
+            <a:r>
+              <a:rPr lang="en-US" smtClean="0"/>
+              <a:t>Chef Software, Inc.</a:t>
+            </a:r>
+            <a:endParaRPr lang="en-US" dirty="0"/>
           </a:p>
         </p:txBody>
       </p:sp>
@@ -2391,12 +2085,12 @@
       </p:sp>
       <p:sp>
         <p:nvSpPr>
-          <p:cNvPr id="4" name="Slide Number Placeholder 3"/>
-          <p:cNvSpPr>
-            <a:spLocks noGrp="1"/>
-          </p:cNvSpPr>
-          <p:nvPr>
-            <p:ph type="sldNum" sz="quarter" idx="10"/>
+          <p:cNvPr id="5" name="Header Placeholder 4"/>
+          <p:cNvSpPr>
+            <a:spLocks noGrp="1"/>
+          </p:cNvSpPr>
+          <p:nvPr>
+            <p:ph type="hdr" sz="quarter" idx="11"/>
           </p:nvPr>
         </p:nvSpPr>
         <p:spPr/>
@@ -2407,25 +2101,22 @@
             <a:pPr>
               <a:defRPr/>
             </a:pPr>
-            <a:fld id="{DC3734AA-3150-D947-AC52-2F5DF48BFCD5}" type="slidenum">
+            <a:r>
               <a:rPr lang="en-US" smtClean="0"/>
-              <a:pPr>
-                <a:defRPr/>
-              </a:pPr>
-              <a:t>7</a:t>
-            </a:fld>
-            <a:endParaRPr lang="en-US" dirty="0"/>
-          </a:p>
-        </p:txBody>
-      </p:sp>
-      <p:sp>
-        <p:nvSpPr>
-          <p:cNvPr id="5" name="Header Placeholder 4"/>
-          <p:cNvSpPr>
-            <a:spLocks noGrp="1"/>
-          </p:cNvSpPr>
-          <p:nvPr>
-            <p:ph type="hdr" sz="quarter" idx="11"/>
+              <a:t>Test Driven Cookbook Development</a:t>
+            </a:r>
+            <a:endParaRPr lang="en-US"/>
+          </a:p>
+        </p:txBody>
+      </p:sp>
+      <p:sp>
+        <p:nvSpPr>
+          <p:cNvPr id="7" name="Date Placeholder 6"/>
+          <p:cNvSpPr>
+            <a:spLocks noGrp="1"/>
+          </p:cNvSpPr>
+          <p:nvPr>
+            <p:ph type="dt" idx="13"/>
           </p:nvPr>
         </p:nvSpPr>
         <p:spPr/>
@@ -2436,29 +2127,11 @@
             <a:pPr>
               <a:defRPr/>
             </a:pPr>
-            <a:endParaRPr lang="en-US"/>
-          </a:p>
-        </p:txBody>
-      </p:sp>
-      <p:sp>
-        <p:nvSpPr>
-          <p:cNvPr id="6" name="Footer Placeholder 5"/>
-          <p:cNvSpPr>
-            <a:spLocks noGrp="1"/>
-          </p:cNvSpPr>
-          <p:nvPr>
-            <p:ph type="ftr" sz="quarter" idx="12"/>
-          </p:nvPr>
-        </p:nvSpPr>
-        <p:spPr/>
-        <p:txBody>
-          <a:bodyPr/>
-          <a:lstStyle/>
-          <a:p>
-            <a:pPr>
-              <a:defRPr/>
-            </a:pPr>
-            <a:endParaRPr lang="en-US"/>
+            <a:r>
+              <a:rPr lang="en-US" smtClean="0"/>
+              <a:t>Chef Software, Inc.</a:t>
+            </a:r>
+            <a:endParaRPr lang="en-US" dirty="0"/>
           </a:p>
         </p:txBody>
       </p:sp>
@@ -2609,12 +2282,12 @@
       </p:sp>
       <p:sp>
         <p:nvSpPr>
-          <p:cNvPr id="4" name="Slide Number Placeholder 3"/>
-          <p:cNvSpPr>
-            <a:spLocks noGrp="1"/>
-          </p:cNvSpPr>
-          <p:nvPr>
-            <p:ph type="sldNum" sz="quarter" idx="10"/>
+          <p:cNvPr id="5" name="Header Placeholder 4"/>
+          <p:cNvSpPr>
+            <a:spLocks noGrp="1"/>
+          </p:cNvSpPr>
+          <p:nvPr>
+            <p:ph type="hdr" sz="quarter" idx="11"/>
           </p:nvPr>
         </p:nvSpPr>
         <p:spPr/>
@@ -2625,25 +2298,22 @@
             <a:pPr>
               <a:defRPr/>
             </a:pPr>
-            <a:fld id="{DC3734AA-3150-D947-AC52-2F5DF48BFCD5}" type="slidenum">
+            <a:r>
               <a:rPr lang="en-US" smtClean="0"/>
-              <a:pPr>
-                <a:defRPr/>
-              </a:pPr>
-              <a:t>8</a:t>
-            </a:fld>
-            <a:endParaRPr lang="en-US" dirty="0"/>
-          </a:p>
-        </p:txBody>
-      </p:sp>
-      <p:sp>
-        <p:nvSpPr>
-          <p:cNvPr id="5" name="Header Placeholder 4"/>
-          <p:cNvSpPr>
-            <a:spLocks noGrp="1"/>
-          </p:cNvSpPr>
-          <p:nvPr>
-            <p:ph type="hdr" sz="quarter" idx="11"/>
+              <a:t>Test Driven Cookbook Development</a:t>
+            </a:r>
+            <a:endParaRPr lang="en-US"/>
+          </a:p>
+        </p:txBody>
+      </p:sp>
+      <p:sp>
+        <p:nvSpPr>
+          <p:cNvPr id="7" name="Date Placeholder 6"/>
+          <p:cNvSpPr>
+            <a:spLocks noGrp="1"/>
+          </p:cNvSpPr>
+          <p:nvPr>
+            <p:ph type="dt" idx="13"/>
           </p:nvPr>
         </p:nvSpPr>
         <p:spPr/>
@@ -2654,29 +2324,11 @@
             <a:pPr>
               <a:defRPr/>
             </a:pPr>
-            <a:endParaRPr lang="en-US"/>
-          </a:p>
-        </p:txBody>
-      </p:sp>
-      <p:sp>
-        <p:nvSpPr>
-          <p:cNvPr id="6" name="Footer Placeholder 5"/>
-          <p:cNvSpPr>
-            <a:spLocks noGrp="1"/>
-          </p:cNvSpPr>
-          <p:nvPr>
-            <p:ph type="ftr" sz="quarter" idx="12"/>
-          </p:nvPr>
-        </p:nvSpPr>
-        <p:spPr/>
-        <p:txBody>
-          <a:bodyPr/>
-          <a:lstStyle/>
-          <a:p>
-            <a:pPr>
-              <a:defRPr/>
-            </a:pPr>
-            <a:endParaRPr lang="en-US"/>
+            <a:r>
+              <a:rPr lang="en-US" smtClean="0"/>
+              <a:t>Chef Software, Inc.</a:t>
+            </a:r>
+            <a:endParaRPr lang="en-US" dirty="0"/>
           </a:p>
         </p:txBody>
       </p:sp>
@@ -2767,12 +2419,12 @@
       </p:sp>
       <p:sp>
         <p:nvSpPr>
-          <p:cNvPr id="4" name="Slide Number Placeholder 3"/>
-          <p:cNvSpPr>
-            <a:spLocks noGrp="1"/>
-          </p:cNvSpPr>
-          <p:nvPr>
-            <p:ph type="sldNum" sz="quarter" idx="10"/>
+          <p:cNvPr id="5" name="Header Placeholder 4"/>
+          <p:cNvSpPr>
+            <a:spLocks noGrp="1"/>
+          </p:cNvSpPr>
+          <p:nvPr>
+            <p:ph type="hdr" sz="quarter" idx="11"/>
           </p:nvPr>
         </p:nvSpPr>
         <p:spPr/>
@@ -2783,25 +2435,22 @@
             <a:pPr>
               <a:defRPr/>
             </a:pPr>
-            <a:fld id="{DC3734AA-3150-D947-AC52-2F5DF48BFCD5}" type="slidenum">
+            <a:r>
               <a:rPr lang="en-US" smtClean="0"/>
-              <a:pPr>
-                <a:defRPr/>
-              </a:pPr>
-              <a:t>9</a:t>
-            </a:fld>
-            <a:endParaRPr lang="en-US" dirty="0"/>
-          </a:p>
-        </p:txBody>
-      </p:sp>
-      <p:sp>
-        <p:nvSpPr>
-          <p:cNvPr id="5" name="Header Placeholder 4"/>
-          <p:cNvSpPr>
-            <a:spLocks noGrp="1"/>
-          </p:cNvSpPr>
-          <p:nvPr>
-            <p:ph type="hdr" sz="quarter" idx="11"/>
+              <a:t>Test Driven Cookbook Development</a:t>
+            </a:r>
+            <a:endParaRPr lang="en-US"/>
+          </a:p>
+        </p:txBody>
+      </p:sp>
+      <p:sp>
+        <p:nvSpPr>
+          <p:cNvPr id="7" name="Date Placeholder 6"/>
+          <p:cNvSpPr>
+            <a:spLocks noGrp="1"/>
+          </p:cNvSpPr>
+          <p:nvPr>
+            <p:ph type="dt" idx="13"/>
           </p:nvPr>
         </p:nvSpPr>
         <p:spPr/>
@@ -2812,29 +2461,11 @@
             <a:pPr>
               <a:defRPr/>
             </a:pPr>
-            <a:endParaRPr lang="en-US"/>
-          </a:p>
-        </p:txBody>
-      </p:sp>
-      <p:sp>
-        <p:nvSpPr>
-          <p:cNvPr id="6" name="Footer Placeholder 5"/>
-          <p:cNvSpPr>
-            <a:spLocks noGrp="1"/>
-          </p:cNvSpPr>
-          <p:nvPr>
-            <p:ph type="ftr" sz="quarter" idx="12"/>
-          </p:nvPr>
-        </p:nvSpPr>
-        <p:spPr/>
-        <p:txBody>
-          <a:bodyPr/>
-          <a:lstStyle/>
-          <a:p>
-            <a:pPr>
-              <a:defRPr/>
-            </a:pPr>
-            <a:endParaRPr lang="en-US"/>
+            <a:r>
+              <a:rPr lang="en-US" smtClean="0"/>
+              <a:t>Chef Software, Inc.</a:t>
+            </a:r>
+            <a:endParaRPr lang="en-US" dirty="0"/>
           </a:p>
         </p:txBody>
       </p:sp>
@@ -9199,7 +8830,7 @@
               <a:defRPr/>
             </a:pPr>
             <a:r>
-              <a:rPr lang="en-US" dirty="0">
+              <a:rPr lang="en-US" dirty="0" smtClean="0">
                 <a:solidFill>
                   <a:srgbClr val="7D868C"/>
                 </a:solidFill>
@@ -9210,7 +8841,7 @@
               <a:t>©</a:t>
             </a:r>
             <a:r>
-              <a:rPr lang="en-US" dirty="0" smtClean="0">
+              <a:rPr lang="is-IS" dirty="0" smtClean="0">
                 <a:solidFill>
                   <a:srgbClr val="7D868C"/>
                 </a:solidFill>
@@ -9218,7 +8849,18 @@
                 <a:ea typeface="+mn-ea"/>
                 <a:cs typeface="+mn-cs"/>
               </a:rPr>
-              <a:t>2016 </a:t>
+              <a:t>2017</a:t>
+            </a:r>
+            <a:r>
+              <a:rPr lang="en-US" dirty="0" smtClean="0">
+                <a:solidFill>
+                  <a:srgbClr val="7D868C"/>
+                </a:solidFill>
+                <a:latin typeface="+mn-lt"/>
+                <a:ea typeface="+mn-ea"/>
+                <a:cs typeface="+mn-cs"/>
+              </a:rPr>
+              <a:t> </a:t>
             </a:r>
             <a:r>
               <a:rPr lang="en-US" dirty="0">
@@ -9968,7 +9610,7 @@
               <a:defRPr/>
             </a:pPr>
             <a:r>
-              <a:rPr lang="en-US" dirty="0">
+              <a:rPr lang="en-US" dirty="0" smtClean="0">
                 <a:solidFill>
                   <a:srgbClr val="7D868C"/>
                 </a:solidFill>
@@ -9979,7 +9621,7 @@
               <a:t>©</a:t>
             </a:r>
             <a:r>
-              <a:rPr lang="en-US" dirty="0" smtClean="0">
+              <a:rPr lang="is-IS" dirty="0" smtClean="0">
                 <a:solidFill>
                   <a:srgbClr val="7D868C"/>
                 </a:solidFill>
@@ -9987,7 +9629,18 @@
                 <a:ea typeface="+mn-ea"/>
                 <a:cs typeface="+mn-cs"/>
               </a:rPr>
-              <a:t>2016 </a:t>
+              <a:t>2017</a:t>
+            </a:r>
+            <a:r>
+              <a:rPr lang="en-US" dirty="0" smtClean="0">
+                <a:solidFill>
+                  <a:srgbClr val="7D868C"/>
+                </a:solidFill>
+                <a:latin typeface="+mn-lt"/>
+                <a:ea typeface="+mn-ea"/>
+                <a:cs typeface="+mn-cs"/>
+              </a:rPr>
+              <a:t> </a:t>
             </a:r>
             <a:r>
               <a:rPr lang="en-US" dirty="0">
@@ -11268,11 +10921,7 @@
             </a:r>
             <a:r>
               <a:rPr lang="en-US" sz="3600" dirty="0" smtClean="0"/>
-              <a:t> in </a:t>
-            </a:r>
-            <a:r>
-              <a:rPr lang="en-US" sz="3600" dirty="0" smtClean="0"/>
-              <a:t>a test-driven development workflow.</a:t>
+              <a:t> in a test-driven development workflow.</a:t>
             </a:r>
           </a:p>
           <a:p>

</xml_diff>